<commit_message>
fixed all missing images
index.html
 - made navbar fixed
 - changed 2nd navbar into dropdown
 - navbar background made transparent
 - navbar background change to dark on xs and on scroll
 - promo images made smaller on xs and removed gray background
 - carousel changed from 21:9 to 2:1 ratio
 - timeline removed max-width
</commit_message>
<xml_diff>
--- a/img/ppt/carousel-images.pptx
+++ b/img/ppt/carousel-images.pptx
@@ -2,28 +2,24 @@
 <file path=ppt/presentation.xml><?xml version="1.0" encoding="utf-8"?>
 <p:presentation xmlns:a="http://schemas.openxmlformats.org/drawingml/2006/main" xmlns:r="http://schemas.openxmlformats.org/officeDocument/2006/relationships" xmlns:p="http://schemas.openxmlformats.org/presentationml/2006/main" saveSubsetFonts="1">
   <p:sldMasterIdLst>
-    <p:sldMasterId id="2147483660" r:id="rId1"/>
+    <p:sldMasterId id="2147483696" r:id="rId1"/>
   </p:sldMasterIdLst>
   <p:sldIdLst>
     <p:sldId id="256" r:id="rId2"/>
-    <p:sldId id="257" r:id="rId3"/>
-    <p:sldId id="264" r:id="rId4"/>
-    <p:sldId id="263" r:id="rId5"/>
-    <p:sldId id="258" r:id="rId6"/>
-    <p:sldId id="262" r:id="rId7"/>
-    <p:sldId id="259" r:id="rId8"/>
-    <p:sldId id="260" r:id="rId9"/>
-    <p:sldId id="261" r:id="rId10"/>
-    <p:sldId id="265" r:id="rId11"/>
+    <p:sldId id="263" r:id="rId3"/>
+    <p:sldId id="258" r:id="rId4"/>
+    <p:sldId id="259" r:id="rId5"/>
+    <p:sldId id="260" r:id="rId6"/>
+    <p:sldId id="261" r:id="rId7"/>
   </p:sldIdLst>
-  <p:sldSz cx="19202400" cy="8229600"/>
+  <p:sldSz cx="9144000" cy="4572000"/>
   <p:notesSz cx="6858000" cy="9144000"/>
   <p:defaultTextStyle>
     <a:defPPr>
       <a:defRPr lang="en-US"/>
     </a:defPPr>
-    <a:lvl1pPr marL="0" algn="l" defTabSz="1316729" rtl="0" eaLnBrk="1" latinLnBrk="0" hangingPunct="1">
-      <a:defRPr sz="2593" kern="1200">
+    <a:lvl1pPr marL="0" algn="l" defTabSz="790035" rtl="0" eaLnBrk="1" latinLnBrk="0" hangingPunct="1">
+      <a:defRPr sz="1555" kern="1200">
         <a:solidFill>
           <a:schemeClr val="tx1"/>
         </a:solidFill>
@@ -32,8 +28,8 @@
         <a:cs typeface="+mn-cs"/>
       </a:defRPr>
     </a:lvl1pPr>
-    <a:lvl2pPr marL="658362" algn="l" defTabSz="1316729" rtl="0" eaLnBrk="1" latinLnBrk="0" hangingPunct="1">
-      <a:defRPr sz="2593" kern="1200">
+    <a:lvl2pPr marL="395015" algn="l" defTabSz="790035" rtl="0" eaLnBrk="1" latinLnBrk="0" hangingPunct="1">
+      <a:defRPr sz="1555" kern="1200">
         <a:solidFill>
           <a:schemeClr val="tx1"/>
         </a:solidFill>
@@ -42,8 +38,8 @@
         <a:cs typeface="+mn-cs"/>
       </a:defRPr>
     </a:lvl2pPr>
-    <a:lvl3pPr marL="1316729" algn="l" defTabSz="1316729" rtl="0" eaLnBrk="1" latinLnBrk="0" hangingPunct="1">
-      <a:defRPr sz="2593" kern="1200">
+    <a:lvl3pPr marL="790035" algn="l" defTabSz="790035" rtl="0" eaLnBrk="1" latinLnBrk="0" hangingPunct="1">
+      <a:defRPr sz="1555" kern="1200">
         <a:solidFill>
           <a:schemeClr val="tx1"/>
         </a:solidFill>
@@ -52,8 +48,8 @@
         <a:cs typeface="+mn-cs"/>
       </a:defRPr>
     </a:lvl3pPr>
-    <a:lvl4pPr marL="1975091" algn="l" defTabSz="1316729" rtl="0" eaLnBrk="1" latinLnBrk="0" hangingPunct="1">
-      <a:defRPr sz="2593" kern="1200">
+    <a:lvl4pPr marL="1185055" algn="l" defTabSz="790035" rtl="0" eaLnBrk="1" latinLnBrk="0" hangingPunct="1">
+      <a:defRPr sz="1555" kern="1200">
         <a:solidFill>
           <a:schemeClr val="tx1"/>
         </a:solidFill>
@@ -62,8 +58,8 @@
         <a:cs typeface="+mn-cs"/>
       </a:defRPr>
     </a:lvl4pPr>
-    <a:lvl5pPr marL="2633456" algn="l" defTabSz="1316729" rtl="0" eaLnBrk="1" latinLnBrk="0" hangingPunct="1">
-      <a:defRPr sz="2593" kern="1200">
+    <a:lvl5pPr marL="1580075" algn="l" defTabSz="790035" rtl="0" eaLnBrk="1" latinLnBrk="0" hangingPunct="1">
+      <a:defRPr sz="1555" kern="1200">
         <a:solidFill>
           <a:schemeClr val="tx1"/>
         </a:solidFill>
@@ -72,8 +68,8 @@
         <a:cs typeface="+mn-cs"/>
       </a:defRPr>
     </a:lvl5pPr>
-    <a:lvl6pPr marL="3291818" algn="l" defTabSz="1316729" rtl="0" eaLnBrk="1" latinLnBrk="0" hangingPunct="1">
-      <a:defRPr sz="2593" kern="1200">
+    <a:lvl6pPr marL="1975090" algn="l" defTabSz="790035" rtl="0" eaLnBrk="1" latinLnBrk="0" hangingPunct="1">
+      <a:defRPr sz="1555" kern="1200">
         <a:solidFill>
           <a:schemeClr val="tx1"/>
         </a:solidFill>
@@ -82,8 +78,8 @@
         <a:cs typeface="+mn-cs"/>
       </a:defRPr>
     </a:lvl6pPr>
-    <a:lvl7pPr marL="3950182" algn="l" defTabSz="1316729" rtl="0" eaLnBrk="1" latinLnBrk="0" hangingPunct="1">
-      <a:defRPr sz="2593" kern="1200">
+    <a:lvl7pPr marL="2370110" algn="l" defTabSz="790035" rtl="0" eaLnBrk="1" latinLnBrk="0" hangingPunct="1">
+      <a:defRPr sz="1555" kern="1200">
         <a:solidFill>
           <a:schemeClr val="tx1"/>
         </a:solidFill>
@@ -92,8 +88,8 @@
         <a:cs typeface="+mn-cs"/>
       </a:defRPr>
     </a:lvl7pPr>
-    <a:lvl8pPr marL="4608547" algn="l" defTabSz="1316729" rtl="0" eaLnBrk="1" latinLnBrk="0" hangingPunct="1">
-      <a:defRPr sz="2593" kern="1200">
+    <a:lvl8pPr marL="2765130" algn="l" defTabSz="790035" rtl="0" eaLnBrk="1" latinLnBrk="0" hangingPunct="1">
+      <a:defRPr sz="1555" kern="1200">
         <a:solidFill>
           <a:schemeClr val="tx1"/>
         </a:solidFill>
@@ -102,8 +98,8 @@
         <a:cs typeface="+mn-cs"/>
       </a:defRPr>
     </a:lvl8pPr>
-    <a:lvl9pPr marL="5266909" algn="l" defTabSz="1316729" rtl="0" eaLnBrk="1" latinLnBrk="0" hangingPunct="1">
-      <a:defRPr sz="2593" kern="1200">
+    <a:lvl9pPr marL="3160145" algn="l" defTabSz="790035" rtl="0" eaLnBrk="1" latinLnBrk="0" hangingPunct="1">
+      <a:defRPr sz="1555" kern="1200">
         <a:solidFill>
           <a:schemeClr val="tx1"/>
         </a:solidFill>
@@ -150,15 +146,15 @@
         </p:nvSpPr>
         <p:spPr>
           <a:xfrm>
-            <a:off x="2400300" y="1346836"/>
-            <a:ext cx="14401800" cy="2865120"/>
+            <a:off x="1143000" y="748242"/>
+            <a:ext cx="6858000" cy="1591733"/>
           </a:xfrm>
         </p:spPr>
         <p:txBody>
           <a:bodyPr anchor="b"/>
           <a:lstStyle>
             <a:lvl1pPr algn="ctr">
-              <a:defRPr sz="7200"/>
+              <a:defRPr sz="4000"/>
             </a:lvl1pPr>
           </a:lstStyle>
           <a:p>
@@ -182,8 +178,8 @@
         </p:nvSpPr>
         <p:spPr>
           <a:xfrm>
-            <a:off x="2400300" y="4322446"/>
-            <a:ext cx="14401800" cy="1986914"/>
+            <a:off x="1143000" y="2401359"/>
+            <a:ext cx="6858000" cy="1103841"/>
           </a:xfrm>
         </p:spPr>
         <p:txBody>
@@ -191,39 +187,39 @@
           <a:lstStyle>
             <a:lvl1pPr marL="0" indent="0" algn="ctr">
               <a:buNone/>
-              <a:defRPr sz="2880"/>
+              <a:defRPr sz="1600"/>
             </a:lvl1pPr>
-            <a:lvl2pPr marL="548640" indent="0" algn="ctr">
-              <a:buNone/>
-              <a:defRPr sz="2400"/>
+            <a:lvl2pPr marL="304815" indent="0" algn="ctr">
+              <a:buNone/>
+              <a:defRPr sz="1333"/>
             </a:lvl2pPr>
-            <a:lvl3pPr marL="1097280" indent="0" algn="ctr">
-              <a:buNone/>
-              <a:defRPr sz="2160"/>
+            <a:lvl3pPr marL="609630" indent="0" algn="ctr">
+              <a:buNone/>
+              <a:defRPr sz="1200"/>
             </a:lvl3pPr>
-            <a:lvl4pPr marL="1645920" indent="0" algn="ctr">
-              <a:buNone/>
-              <a:defRPr sz="1920"/>
+            <a:lvl4pPr marL="914446" indent="0" algn="ctr">
+              <a:buNone/>
+              <a:defRPr sz="1067"/>
             </a:lvl4pPr>
-            <a:lvl5pPr marL="2194560" indent="0" algn="ctr">
-              <a:buNone/>
-              <a:defRPr sz="1920"/>
+            <a:lvl5pPr marL="1219261" indent="0" algn="ctr">
+              <a:buNone/>
+              <a:defRPr sz="1067"/>
             </a:lvl5pPr>
-            <a:lvl6pPr marL="2743200" indent="0" algn="ctr">
-              <a:buNone/>
-              <a:defRPr sz="1920"/>
+            <a:lvl6pPr marL="1524076" indent="0" algn="ctr">
+              <a:buNone/>
+              <a:defRPr sz="1067"/>
             </a:lvl6pPr>
-            <a:lvl7pPr marL="3291840" indent="0" algn="ctr">
-              <a:buNone/>
-              <a:defRPr sz="1920"/>
+            <a:lvl7pPr marL="1828891" indent="0" algn="ctr">
+              <a:buNone/>
+              <a:defRPr sz="1067"/>
             </a:lvl7pPr>
-            <a:lvl8pPr marL="3840480" indent="0" algn="ctr">
-              <a:buNone/>
-              <a:defRPr sz="1920"/>
+            <a:lvl8pPr marL="2133707" indent="0" algn="ctr">
+              <a:buNone/>
+              <a:defRPr sz="1067"/>
             </a:lvl8pPr>
-            <a:lvl9pPr marL="4389120" indent="0" algn="ctr">
-              <a:buNone/>
-              <a:defRPr sz="1920"/>
+            <a:lvl9pPr marL="2438522" indent="0" algn="ctr">
+              <a:buNone/>
+              <a:defRPr sz="1067"/>
             </a:lvl9pPr>
           </a:lstStyle>
           <a:p>
@@ -252,7 +248,7 @@
           <a:p>
             <a:fld id="{7B30DEEB-4051-4B0C-A7AF-4DAE803EFFB5}" type="datetimeFigureOut">
               <a:rPr lang="en-US" smtClean="0"/>
-              <a:t>10/5/2017</a:t>
+              <a:t>11/9/2017</a:t>
             </a:fld>
             <a:endParaRPr lang="en-US"/>
           </a:p>
@@ -303,7 +299,7 @@
     </p:spTree>
     <p:extLst>
       <p:ext uri="{BB962C8B-B14F-4D97-AF65-F5344CB8AC3E}">
-        <p14:creationId xmlns:p14="http://schemas.microsoft.com/office/powerpoint/2010/main" val="1470922483"/>
+        <p14:creationId xmlns:p14="http://schemas.microsoft.com/office/powerpoint/2010/main" val="935133186"/>
       </p:ext>
     </p:extLst>
   </p:cSld>
@@ -422,7 +418,7 @@
           <a:p>
             <a:fld id="{7B30DEEB-4051-4B0C-A7AF-4DAE803EFFB5}" type="datetimeFigureOut">
               <a:rPr lang="en-US" smtClean="0"/>
-              <a:t>10/5/2017</a:t>
+              <a:t>11/9/2017</a:t>
             </a:fld>
             <a:endParaRPr lang="en-US"/>
           </a:p>
@@ -473,7 +469,7 @@
     </p:spTree>
     <p:extLst>
       <p:ext uri="{BB962C8B-B14F-4D97-AF65-F5344CB8AC3E}">
-        <p14:creationId xmlns:p14="http://schemas.microsoft.com/office/powerpoint/2010/main" val="3135027664"/>
+        <p14:creationId xmlns:p14="http://schemas.microsoft.com/office/powerpoint/2010/main" val="3247676688"/>
       </p:ext>
     </p:extLst>
   </p:cSld>
@@ -512,8 +508,8 @@
         </p:nvSpPr>
         <p:spPr>
           <a:xfrm>
-            <a:off x="13741717" y="438150"/>
-            <a:ext cx="4140518" cy="6974206"/>
+            <a:off x="6543675" y="243417"/>
+            <a:ext cx="1971675" cy="3874559"/>
           </a:xfrm>
         </p:spPr>
         <p:txBody>
@@ -540,8 +536,8 @@
         </p:nvSpPr>
         <p:spPr>
           <a:xfrm>
-            <a:off x="1320165" y="438150"/>
-            <a:ext cx="12181523" cy="6974206"/>
+            <a:off x="628650" y="243417"/>
+            <a:ext cx="5800725" cy="3874559"/>
           </a:xfrm>
         </p:spPr>
         <p:txBody>
@@ -602,7 +598,7 @@
           <a:p>
             <a:fld id="{7B30DEEB-4051-4B0C-A7AF-4DAE803EFFB5}" type="datetimeFigureOut">
               <a:rPr lang="en-US" smtClean="0"/>
-              <a:t>10/5/2017</a:t>
+              <a:t>11/9/2017</a:t>
             </a:fld>
             <a:endParaRPr lang="en-US"/>
           </a:p>
@@ -653,7 +649,7 @@
     </p:spTree>
     <p:extLst>
       <p:ext uri="{BB962C8B-B14F-4D97-AF65-F5344CB8AC3E}">
-        <p14:creationId xmlns:p14="http://schemas.microsoft.com/office/powerpoint/2010/main" val="2921109306"/>
+        <p14:creationId xmlns:p14="http://schemas.microsoft.com/office/powerpoint/2010/main" val="1431155950"/>
       </p:ext>
     </p:extLst>
   </p:cSld>
@@ -772,7 +768,7 @@
           <a:p>
             <a:fld id="{7B30DEEB-4051-4B0C-A7AF-4DAE803EFFB5}" type="datetimeFigureOut">
               <a:rPr lang="en-US" smtClean="0"/>
-              <a:t>10/5/2017</a:t>
+              <a:t>11/9/2017</a:t>
             </a:fld>
             <a:endParaRPr lang="en-US"/>
           </a:p>
@@ -823,7 +819,7 @@
     </p:spTree>
     <p:extLst>
       <p:ext uri="{BB962C8B-B14F-4D97-AF65-F5344CB8AC3E}">
-        <p14:creationId xmlns:p14="http://schemas.microsoft.com/office/powerpoint/2010/main" val="359737368"/>
+        <p14:creationId xmlns:p14="http://schemas.microsoft.com/office/powerpoint/2010/main" val="1550170325"/>
       </p:ext>
     </p:extLst>
   </p:cSld>
@@ -862,15 +858,15 @@
         </p:nvSpPr>
         <p:spPr>
           <a:xfrm>
-            <a:off x="1310164" y="2051686"/>
-            <a:ext cx="16562070" cy="3423284"/>
+            <a:off x="623888" y="1139826"/>
+            <a:ext cx="7886700" cy="1901825"/>
           </a:xfrm>
         </p:spPr>
         <p:txBody>
           <a:bodyPr anchor="b"/>
           <a:lstStyle>
             <a:lvl1pPr>
-              <a:defRPr sz="7200"/>
+              <a:defRPr sz="4000"/>
             </a:lvl1pPr>
           </a:lstStyle>
           <a:p>
@@ -894,8 +890,8 @@
         </p:nvSpPr>
         <p:spPr>
           <a:xfrm>
-            <a:off x="1310164" y="5507356"/>
-            <a:ext cx="16562070" cy="1800224"/>
+            <a:off x="623888" y="3059642"/>
+            <a:ext cx="7886700" cy="1000125"/>
           </a:xfrm>
         </p:spPr>
         <p:txBody>
@@ -903,7 +899,7 @@
           <a:lstStyle>
             <a:lvl1pPr marL="0" indent="0">
               <a:buNone/>
-              <a:defRPr sz="2880">
+              <a:defRPr sz="1600">
                 <a:solidFill>
                   <a:schemeClr val="tx1">
                     <a:tint val="75000"/>
@@ -911,9 +907,9 @@
                 </a:solidFill>
               </a:defRPr>
             </a:lvl1pPr>
-            <a:lvl2pPr marL="548640" indent="0">
-              <a:buNone/>
-              <a:defRPr sz="2400">
+            <a:lvl2pPr marL="304815" indent="0">
+              <a:buNone/>
+              <a:defRPr sz="1333">
                 <a:solidFill>
                   <a:schemeClr val="tx1">
                     <a:tint val="75000"/>
@@ -921,9 +917,9 @@
                 </a:solidFill>
               </a:defRPr>
             </a:lvl2pPr>
-            <a:lvl3pPr marL="1097280" indent="0">
-              <a:buNone/>
-              <a:defRPr sz="2160">
+            <a:lvl3pPr marL="609630" indent="0">
+              <a:buNone/>
+              <a:defRPr sz="1200">
                 <a:solidFill>
                   <a:schemeClr val="tx1">
                     <a:tint val="75000"/>
@@ -931,9 +927,9 @@
                 </a:solidFill>
               </a:defRPr>
             </a:lvl3pPr>
-            <a:lvl4pPr marL="1645920" indent="0">
-              <a:buNone/>
-              <a:defRPr sz="1920">
+            <a:lvl4pPr marL="914446" indent="0">
+              <a:buNone/>
+              <a:defRPr sz="1067">
                 <a:solidFill>
                   <a:schemeClr val="tx1">
                     <a:tint val="75000"/>
@@ -941,9 +937,9 @@
                 </a:solidFill>
               </a:defRPr>
             </a:lvl4pPr>
-            <a:lvl5pPr marL="2194560" indent="0">
-              <a:buNone/>
-              <a:defRPr sz="1920">
+            <a:lvl5pPr marL="1219261" indent="0">
+              <a:buNone/>
+              <a:defRPr sz="1067">
                 <a:solidFill>
                   <a:schemeClr val="tx1">
                     <a:tint val="75000"/>
@@ -951,9 +947,9 @@
                 </a:solidFill>
               </a:defRPr>
             </a:lvl5pPr>
-            <a:lvl6pPr marL="2743200" indent="0">
-              <a:buNone/>
-              <a:defRPr sz="1920">
+            <a:lvl6pPr marL="1524076" indent="0">
+              <a:buNone/>
+              <a:defRPr sz="1067">
                 <a:solidFill>
                   <a:schemeClr val="tx1">
                     <a:tint val="75000"/>
@@ -961,9 +957,9 @@
                 </a:solidFill>
               </a:defRPr>
             </a:lvl6pPr>
-            <a:lvl7pPr marL="3291840" indent="0">
-              <a:buNone/>
-              <a:defRPr sz="1920">
+            <a:lvl7pPr marL="1828891" indent="0">
+              <a:buNone/>
+              <a:defRPr sz="1067">
                 <a:solidFill>
                   <a:schemeClr val="tx1">
                     <a:tint val="75000"/>
@@ -971,9 +967,9 @@
                 </a:solidFill>
               </a:defRPr>
             </a:lvl7pPr>
-            <a:lvl8pPr marL="3840480" indent="0">
-              <a:buNone/>
-              <a:defRPr sz="1920">
+            <a:lvl8pPr marL="2133707" indent="0">
+              <a:buNone/>
+              <a:defRPr sz="1067">
                 <a:solidFill>
                   <a:schemeClr val="tx1">
                     <a:tint val="75000"/>
@@ -981,9 +977,9 @@
                 </a:solidFill>
               </a:defRPr>
             </a:lvl8pPr>
-            <a:lvl9pPr marL="4389120" indent="0">
-              <a:buNone/>
-              <a:defRPr sz="1920">
+            <a:lvl9pPr marL="2438522" indent="0">
+              <a:buNone/>
+              <a:defRPr sz="1067">
                 <a:solidFill>
                   <a:schemeClr val="tx1">
                     <a:tint val="75000"/>
@@ -1018,7 +1014,7 @@
           <a:p>
             <a:fld id="{7B30DEEB-4051-4B0C-A7AF-4DAE803EFFB5}" type="datetimeFigureOut">
               <a:rPr lang="en-US" smtClean="0"/>
-              <a:t>10/5/2017</a:t>
+              <a:t>11/9/2017</a:t>
             </a:fld>
             <a:endParaRPr lang="en-US"/>
           </a:p>
@@ -1069,7 +1065,7 @@
     </p:spTree>
     <p:extLst>
       <p:ext uri="{BB962C8B-B14F-4D97-AF65-F5344CB8AC3E}">
-        <p14:creationId xmlns:p14="http://schemas.microsoft.com/office/powerpoint/2010/main" val="1370887987"/>
+        <p14:creationId xmlns:p14="http://schemas.microsoft.com/office/powerpoint/2010/main" val="1734095952"/>
       </p:ext>
     </p:extLst>
   </p:cSld>
@@ -1131,8 +1127,8 @@
         </p:nvSpPr>
         <p:spPr>
           <a:xfrm>
-            <a:off x="1320165" y="2190750"/>
-            <a:ext cx="8161020" cy="5221606"/>
+            <a:off x="628650" y="1217083"/>
+            <a:ext cx="3886200" cy="2900892"/>
           </a:xfrm>
         </p:spPr>
         <p:txBody>
@@ -1188,8 +1184,8 @@
         </p:nvSpPr>
         <p:spPr>
           <a:xfrm>
-            <a:off x="9721215" y="2190750"/>
-            <a:ext cx="8161020" cy="5221606"/>
+            <a:off x="4629150" y="1217083"/>
+            <a:ext cx="3886200" cy="2900892"/>
           </a:xfrm>
         </p:spPr>
         <p:txBody>
@@ -1250,7 +1246,7 @@
           <a:p>
             <a:fld id="{7B30DEEB-4051-4B0C-A7AF-4DAE803EFFB5}" type="datetimeFigureOut">
               <a:rPr lang="en-US" smtClean="0"/>
-              <a:t>10/5/2017</a:t>
+              <a:t>11/9/2017</a:t>
             </a:fld>
             <a:endParaRPr lang="en-US"/>
           </a:p>
@@ -1301,7 +1297,7 @@
     </p:spTree>
     <p:extLst>
       <p:ext uri="{BB962C8B-B14F-4D97-AF65-F5344CB8AC3E}">
-        <p14:creationId xmlns:p14="http://schemas.microsoft.com/office/powerpoint/2010/main" val="2425581987"/>
+        <p14:creationId xmlns:p14="http://schemas.microsoft.com/office/powerpoint/2010/main" val="2645946986"/>
       </p:ext>
     </p:extLst>
   </p:cSld>
@@ -1340,8 +1336,8 @@
         </p:nvSpPr>
         <p:spPr>
           <a:xfrm>
-            <a:off x="1322666" y="438150"/>
-            <a:ext cx="16562070" cy="1590676"/>
+            <a:off x="629841" y="243417"/>
+            <a:ext cx="7886700" cy="883709"/>
           </a:xfrm>
         </p:spPr>
         <p:txBody>
@@ -1368,8 +1364,8 @@
         </p:nvSpPr>
         <p:spPr>
           <a:xfrm>
-            <a:off x="1322667" y="2017396"/>
-            <a:ext cx="8123515" cy="988694"/>
+            <a:off x="629842" y="1120775"/>
+            <a:ext cx="3868340" cy="549275"/>
           </a:xfrm>
         </p:spPr>
         <p:txBody>
@@ -1377,39 +1373,39 @@
           <a:lstStyle>
             <a:lvl1pPr marL="0" indent="0">
               <a:buNone/>
-              <a:defRPr sz="2880" b="1"/>
+              <a:defRPr sz="1600" b="1"/>
             </a:lvl1pPr>
-            <a:lvl2pPr marL="548640" indent="0">
-              <a:buNone/>
-              <a:defRPr sz="2400" b="1"/>
+            <a:lvl2pPr marL="304815" indent="0">
+              <a:buNone/>
+              <a:defRPr sz="1333" b="1"/>
             </a:lvl2pPr>
-            <a:lvl3pPr marL="1097280" indent="0">
-              <a:buNone/>
-              <a:defRPr sz="2160" b="1"/>
+            <a:lvl3pPr marL="609630" indent="0">
+              <a:buNone/>
+              <a:defRPr sz="1200" b="1"/>
             </a:lvl3pPr>
-            <a:lvl4pPr marL="1645920" indent="0">
-              <a:buNone/>
-              <a:defRPr sz="1920" b="1"/>
+            <a:lvl4pPr marL="914446" indent="0">
+              <a:buNone/>
+              <a:defRPr sz="1067" b="1"/>
             </a:lvl4pPr>
-            <a:lvl5pPr marL="2194560" indent="0">
-              <a:buNone/>
-              <a:defRPr sz="1920" b="1"/>
+            <a:lvl5pPr marL="1219261" indent="0">
+              <a:buNone/>
+              <a:defRPr sz="1067" b="1"/>
             </a:lvl5pPr>
-            <a:lvl6pPr marL="2743200" indent="0">
-              <a:buNone/>
-              <a:defRPr sz="1920" b="1"/>
+            <a:lvl6pPr marL="1524076" indent="0">
+              <a:buNone/>
+              <a:defRPr sz="1067" b="1"/>
             </a:lvl6pPr>
-            <a:lvl7pPr marL="3291840" indent="0">
-              <a:buNone/>
-              <a:defRPr sz="1920" b="1"/>
+            <a:lvl7pPr marL="1828891" indent="0">
+              <a:buNone/>
+              <a:defRPr sz="1067" b="1"/>
             </a:lvl7pPr>
-            <a:lvl8pPr marL="3840480" indent="0">
-              <a:buNone/>
-              <a:defRPr sz="1920" b="1"/>
+            <a:lvl8pPr marL="2133707" indent="0">
+              <a:buNone/>
+              <a:defRPr sz="1067" b="1"/>
             </a:lvl8pPr>
-            <a:lvl9pPr marL="4389120" indent="0">
-              <a:buNone/>
-              <a:defRPr sz="1920" b="1"/>
+            <a:lvl9pPr marL="2438522" indent="0">
+              <a:buNone/>
+              <a:defRPr sz="1067" b="1"/>
             </a:lvl9pPr>
           </a:lstStyle>
           <a:p>
@@ -1433,8 +1429,8 @@
         </p:nvSpPr>
         <p:spPr>
           <a:xfrm>
-            <a:off x="1322667" y="3006090"/>
-            <a:ext cx="8123515" cy="4421506"/>
+            <a:off x="629842" y="1670050"/>
+            <a:ext cx="3868340" cy="2456392"/>
           </a:xfrm>
         </p:spPr>
         <p:txBody>
@@ -1490,8 +1486,8 @@
         </p:nvSpPr>
         <p:spPr>
           <a:xfrm>
-            <a:off x="9721215" y="2017396"/>
-            <a:ext cx="8163521" cy="988694"/>
+            <a:off x="4629150" y="1120775"/>
+            <a:ext cx="3887391" cy="549275"/>
           </a:xfrm>
         </p:spPr>
         <p:txBody>
@@ -1499,39 +1495,39 @@
           <a:lstStyle>
             <a:lvl1pPr marL="0" indent="0">
               <a:buNone/>
-              <a:defRPr sz="2880" b="1"/>
+              <a:defRPr sz="1600" b="1"/>
             </a:lvl1pPr>
-            <a:lvl2pPr marL="548640" indent="0">
-              <a:buNone/>
-              <a:defRPr sz="2400" b="1"/>
+            <a:lvl2pPr marL="304815" indent="0">
+              <a:buNone/>
+              <a:defRPr sz="1333" b="1"/>
             </a:lvl2pPr>
-            <a:lvl3pPr marL="1097280" indent="0">
-              <a:buNone/>
-              <a:defRPr sz="2160" b="1"/>
+            <a:lvl3pPr marL="609630" indent="0">
+              <a:buNone/>
+              <a:defRPr sz="1200" b="1"/>
             </a:lvl3pPr>
-            <a:lvl4pPr marL="1645920" indent="0">
-              <a:buNone/>
-              <a:defRPr sz="1920" b="1"/>
+            <a:lvl4pPr marL="914446" indent="0">
+              <a:buNone/>
+              <a:defRPr sz="1067" b="1"/>
             </a:lvl4pPr>
-            <a:lvl5pPr marL="2194560" indent="0">
-              <a:buNone/>
-              <a:defRPr sz="1920" b="1"/>
+            <a:lvl5pPr marL="1219261" indent="0">
+              <a:buNone/>
+              <a:defRPr sz="1067" b="1"/>
             </a:lvl5pPr>
-            <a:lvl6pPr marL="2743200" indent="0">
-              <a:buNone/>
-              <a:defRPr sz="1920" b="1"/>
+            <a:lvl6pPr marL="1524076" indent="0">
+              <a:buNone/>
+              <a:defRPr sz="1067" b="1"/>
             </a:lvl6pPr>
-            <a:lvl7pPr marL="3291840" indent="0">
-              <a:buNone/>
-              <a:defRPr sz="1920" b="1"/>
+            <a:lvl7pPr marL="1828891" indent="0">
+              <a:buNone/>
+              <a:defRPr sz="1067" b="1"/>
             </a:lvl7pPr>
-            <a:lvl8pPr marL="3840480" indent="0">
-              <a:buNone/>
-              <a:defRPr sz="1920" b="1"/>
+            <a:lvl8pPr marL="2133707" indent="0">
+              <a:buNone/>
+              <a:defRPr sz="1067" b="1"/>
             </a:lvl8pPr>
-            <a:lvl9pPr marL="4389120" indent="0">
-              <a:buNone/>
-              <a:defRPr sz="1920" b="1"/>
+            <a:lvl9pPr marL="2438522" indent="0">
+              <a:buNone/>
+              <a:defRPr sz="1067" b="1"/>
             </a:lvl9pPr>
           </a:lstStyle>
           <a:p>
@@ -1555,8 +1551,8 @@
         </p:nvSpPr>
         <p:spPr>
           <a:xfrm>
-            <a:off x="9721215" y="3006090"/>
-            <a:ext cx="8163521" cy="4421506"/>
+            <a:off x="4629150" y="1670050"/>
+            <a:ext cx="3887391" cy="2456392"/>
           </a:xfrm>
         </p:spPr>
         <p:txBody>
@@ -1617,7 +1613,7 @@
           <a:p>
             <a:fld id="{7B30DEEB-4051-4B0C-A7AF-4DAE803EFFB5}" type="datetimeFigureOut">
               <a:rPr lang="en-US" smtClean="0"/>
-              <a:t>10/5/2017</a:t>
+              <a:t>11/9/2017</a:t>
             </a:fld>
             <a:endParaRPr lang="en-US"/>
           </a:p>
@@ -1668,7 +1664,7 @@
     </p:spTree>
     <p:extLst>
       <p:ext uri="{BB962C8B-B14F-4D97-AF65-F5344CB8AC3E}">
-        <p14:creationId xmlns:p14="http://schemas.microsoft.com/office/powerpoint/2010/main" val="1319839540"/>
+        <p14:creationId xmlns:p14="http://schemas.microsoft.com/office/powerpoint/2010/main" val="3691395567"/>
       </p:ext>
     </p:extLst>
   </p:cSld>
@@ -1735,7 +1731,7 @@
           <a:p>
             <a:fld id="{7B30DEEB-4051-4B0C-A7AF-4DAE803EFFB5}" type="datetimeFigureOut">
               <a:rPr lang="en-US" smtClean="0"/>
-              <a:t>10/5/2017</a:t>
+              <a:t>11/9/2017</a:t>
             </a:fld>
             <a:endParaRPr lang="en-US"/>
           </a:p>
@@ -1786,7 +1782,7 @@
     </p:spTree>
     <p:extLst>
       <p:ext uri="{BB962C8B-B14F-4D97-AF65-F5344CB8AC3E}">
-        <p14:creationId xmlns:p14="http://schemas.microsoft.com/office/powerpoint/2010/main" val="1393611547"/>
+        <p14:creationId xmlns:p14="http://schemas.microsoft.com/office/powerpoint/2010/main" val="3401278189"/>
       </p:ext>
     </p:extLst>
   </p:cSld>
@@ -1830,7 +1826,7 @@
           <a:p>
             <a:fld id="{7B30DEEB-4051-4B0C-A7AF-4DAE803EFFB5}" type="datetimeFigureOut">
               <a:rPr lang="en-US" smtClean="0"/>
-              <a:t>10/5/2017</a:t>
+              <a:t>11/9/2017</a:t>
             </a:fld>
             <a:endParaRPr lang="en-US"/>
           </a:p>
@@ -1881,7 +1877,7 @@
     </p:spTree>
     <p:extLst>
       <p:ext uri="{BB962C8B-B14F-4D97-AF65-F5344CB8AC3E}">
-        <p14:creationId xmlns:p14="http://schemas.microsoft.com/office/powerpoint/2010/main" val="3569323658"/>
+        <p14:creationId xmlns:p14="http://schemas.microsoft.com/office/powerpoint/2010/main" val="2692568493"/>
       </p:ext>
     </p:extLst>
   </p:cSld>
@@ -1920,15 +1916,15 @@
         </p:nvSpPr>
         <p:spPr>
           <a:xfrm>
-            <a:off x="1322667" y="548640"/>
-            <a:ext cx="6193273" cy="1920240"/>
+            <a:off x="629841" y="304800"/>
+            <a:ext cx="2949178" cy="1066800"/>
           </a:xfrm>
         </p:spPr>
         <p:txBody>
           <a:bodyPr anchor="b"/>
           <a:lstStyle>
             <a:lvl1pPr>
-              <a:defRPr sz="3840"/>
+              <a:defRPr sz="2133"/>
             </a:lvl1pPr>
           </a:lstStyle>
           <a:p>
@@ -1952,39 +1948,39 @@
         </p:nvSpPr>
         <p:spPr>
           <a:xfrm>
-            <a:off x="8163521" y="1184911"/>
-            <a:ext cx="9721215" cy="5848350"/>
+            <a:off x="3887391" y="658284"/>
+            <a:ext cx="4629150" cy="3249083"/>
           </a:xfrm>
         </p:spPr>
         <p:txBody>
           <a:bodyPr/>
           <a:lstStyle>
             <a:lvl1pPr>
-              <a:defRPr sz="3840"/>
+              <a:defRPr sz="2133"/>
             </a:lvl1pPr>
             <a:lvl2pPr>
-              <a:defRPr sz="3360"/>
+              <a:defRPr sz="1867"/>
             </a:lvl2pPr>
             <a:lvl3pPr>
-              <a:defRPr sz="2880"/>
+              <a:defRPr sz="1600"/>
             </a:lvl3pPr>
             <a:lvl4pPr>
-              <a:defRPr sz="2400"/>
+              <a:defRPr sz="1333"/>
             </a:lvl4pPr>
             <a:lvl5pPr>
-              <a:defRPr sz="2400"/>
+              <a:defRPr sz="1333"/>
             </a:lvl5pPr>
             <a:lvl6pPr>
-              <a:defRPr sz="2400"/>
+              <a:defRPr sz="1333"/>
             </a:lvl6pPr>
             <a:lvl7pPr>
-              <a:defRPr sz="2400"/>
+              <a:defRPr sz="1333"/>
             </a:lvl7pPr>
             <a:lvl8pPr>
-              <a:defRPr sz="2400"/>
+              <a:defRPr sz="1333"/>
             </a:lvl8pPr>
             <a:lvl9pPr>
-              <a:defRPr sz="2400"/>
+              <a:defRPr sz="1333"/>
             </a:lvl9pPr>
           </a:lstStyle>
           <a:p>
@@ -2037,8 +2033,8 @@
         </p:nvSpPr>
         <p:spPr>
           <a:xfrm>
-            <a:off x="1322667" y="2468880"/>
-            <a:ext cx="6193273" cy="4573906"/>
+            <a:off x="629841" y="1371600"/>
+            <a:ext cx="2949178" cy="2541059"/>
           </a:xfrm>
         </p:spPr>
         <p:txBody>
@@ -2046,39 +2042,39 @@
           <a:lstStyle>
             <a:lvl1pPr marL="0" indent="0">
               <a:buNone/>
-              <a:defRPr sz="1920"/>
+              <a:defRPr sz="1067"/>
             </a:lvl1pPr>
-            <a:lvl2pPr marL="548640" indent="0">
-              <a:buNone/>
-              <a:defRPr sz="1680"/>
+            <a:lvl2pPr marL="304815" indent="0">
+              <a:buNone/>
+              <a:defRPr sz="933"/>
             </a:lvl2pPr>
-            <a:lvl3pPr marL="1097280" indent="0">
-              <a:buNone/>
-              <a:defRPr sz="1440"/>
+            <a:lvl3pPr marL="609630" indent="0">
+              <a:buNone/>
+              <a:defRPr sz="800"/>
             </a:lvl3pPr>
-            <a:lvl4pPr marL="1645920" indent="0">
-              <a:buNone/>
-              <a:defRPr sz="1200"/>
+            <a:lvl4pPr marL="914446" indent="0">
+              <a:buNone/>
+              <a:defRPr sz="667"/>
             </a:lvl4pPr>
-            <a:lvl5pPr marL="2194560" indent="0">
-              <a:buNone/>
-              <a:defRPr sz="1200"/>
+            <a:lvl5pPr marL="1219261" indent="0">
+              <a:buNone/>
+              <a:defRPr sz="667"/>
             </a:lvl5pPr>
-            <a:lvl6pPr marL="2743200" indent="0">
-              <a:buNone/>
-              <a:defRPr sz="1200"/>
+            <a:lvl6pPr marL="1524076" indent="0">
+              <a:buNone/>
+              <a:defRPr sz="667"/>
             </a:lvl6pPr>
-            <a:lvl7pPr marL="3291840" indent="0">
-              <a:buNone/>
-              <a:defRPr sz="1200"/>
+            <a:lvl7pPr marL="1828891" indent="0">
+              <a:buNone/>
+              <a:defRPr sz="667"/>
             </a:lvl7pPr>
-            <a:lvl8pPr marL="3840480" indent="0">
-              <a:buNone/>
-              <a:defRPr sz="1200"/>
+            <a:lvl8pPr marL="2133707" indent="0">
+              <a:buNone/>
+              <a:defRPr sz="667"/>
             </a:lvl8pPr>
-            <a:lvl9pPr marL="4389120" indent="0">
-              <a:buNone/>
-              <a:defRPr sz="1200"/>
+            <a:lvl9pPr marL="2438522" indent="0">
+              <a:buNone/>
+              <a:defRPr sz="667"/>
             </a:lvl9pPr>
           </a:lstStyle>
           <a:p>
@@ -2107,7 +2103,7 @@
           <a:p>
             <a:fld id="{7B30DEEB-4051-4B0C-A7AF-4DAE803EFFB5}" type="datetimeFigureOut">
               <a:rPr lang="en-US" smtClean="0"/>
-              <a:t>10/5/2017</a:t>
+              <a:t>11/9/2017</a:t>
             </a:fld>
             <a:endParaRPr lang="en-US"/>
           </a:p>
@@ -2158,7 +2154,7 @@
     </p:spTree>
     <p:extLst>
       <p:ext uri="{BB962C8B-B14F-4D97-AF65-F5344CB8AC3E}">
-        <p14:creationId xmlns:p14="http://schemas.microsoft.com/office/powerpoint/2010/main" val="41951215"/>
+        <p14:creationId xmlns:p14="http://schemas.microsoft.com/office/powerpoint/2010/main" val="828423615"/>
       </p:ext>
     </p:extLst>
   </p:cSld>
@@ -2197,15 +2193,15 @@
         </p:nvSpPr>
         <p:spPr>
           <a:xfrm>
-            <a:off x="1322667" y="548640"/>
-            <a:ext cx="6193273" cy="1920240"/>
+            <a:off x="629841" y="304800"/>
+            <a:ext cx="2949178" cy="1066800"/>
           </a:xfrm>
         </p:spPr>
         <p:txBody>
           <a:bodyPr anchor="b"/>
           <a:lstStyle>
             <a:lvl1pPr>
-              <a:defRPr sz="3840"/>
+              <a:defRPr sz="2133"/>
             </a:lvl1pPr>
           </a:lstStyle>
           <a:p>
@@ -2229,8 +2225,8 @@
         </p:nvSpPr>
         <p:spPr>
           <a:xfrm>
-            <a:off x="8163521" y="1184911"/>
-            <a:ext cx="9721215" cy="5848350"/>
+            <a:off x="3887391" y="658284"/>
+            <a:ext cx="4629150" cy="3249083"/>
           </a:xfrm>
         </p:spPr>
         <p:txBody>
@@ -2238,39 +2234,39 @@
           <a:lstStyle>
             <a:lvl1pPr marL="0" indent="0">
               <a:buNone/>
-              <a:defRPr sz="3840"/>
+              <a:defRPr sz="2133"/>
             </a:lvl1pPr>
-            <a:lvl2pPr marL="548640" indent="0">
-              <a:buNone/>
-              <a:defRPr sz="3360"/>
+            <a:lvl2pPr marL="304815" indent="0">
+              <a:buNone/>
+              <a:defRPr sz="1867"/>
             </a:lvl2pPr>
-            <a:lvl3pPr marL="1097280" indent="0">
-              <a:buNone/>
-              <a:defRPr sz="2880"/>
+            <a:lvl3pPr marL="609630" indent="0">
+              <a:buNone/>
+              <a:defRPr sz="1600"/>
             </a:lvl3pPr>
-            <a:lvl4pPr marL="1645920" indent="0">
-              <a:buNone/>
-              <a:defRPr sz="2400"/>
+            <a:lvl4pPr marL="914446" indent="0">
+              <a:buNone/>
+              <a:defRPr sz="1333"/>
             </a:lvl4pPr>
-            <a:lvl5pPr marL="2194560" indent="0">
-              <a:buNone/>
-              <a:defRPr sz="2400"/>
+            <a:lvl5pPr marL="1219261" indent="0">
+              <a:buNone/>
+              <a:defRPr sz="1333"/>
             </a:lvl5pPr>
-            <a:lvl6pPr marL="2743200" indent="0">
-              <a:buNone/>
-              <a:defRPr sz="2400"/>
+            <a:lvl6pPr marL="1524076" indent="0">
+              <a:buNone/>
+              <a:defRPr sz="1333"/>
             </a:lvl6pPr>
-            <a:lvl7pPr marL="3291840" indent="0">
-              <a:buNone/>
-              <a:defRPr sz="2400"/>
+            <a:lvl7pPr marL="1828891" indent="0">
+              <a:buNone/>
+              <a:defRPr sz="1333"/>
             </a:lvl7pPr>
-            <a:lvl8pPr marL="3840480" indent="0">
-              <a:buNone/>
-              <a:defRPr sz="2400"/>
+            <a:lvl8pPr marL="2133707" indent="0">
+              <a:buNone/>
+              <a:defRPr sz="1333"/>
             </a:lvl8pPr>
-            <a:lvl9pPr marL="4389120" indent="0">
-              <a:buNone/>
-              <a:defRPr sz="2400"/>
+            <a:lvl9pPr marL="2438522" indent="0">
+              <a:buNone/>
+              <a:defRPr sz="1333"/>
             </a:lvl9pPr>
           </a:lstStyle>
           <a:p>
@@ -2294,8 +2290,8 @@
         </p:nvSpPr>
         <p:spPr>
           <a:xfrm>
-            <a:off x="1322667" y="2468880"/>
-            <a:ext cx="6193273" cy="4573906"/>
+            <a:off x="629841" y="1371600"/>
+            <a:ext cx="2949178" cy="2541059"/>
           </a:xfrm>
         </p:spPr>
         <p:txBody>
@@ -2303,39 +2299,39 @@
           <a:lstStyle>
             <a:lvl1pPr marL="0" indent="0">
               <a:buNone/>
-              <a:defRPr sz="1920"/>
+              <a:defRPr sz="1067"/>
             </a:lvl1pPr>
-            <a:lvl2pPr marL="548640" indent="0">
-              <a:buNone/>
-              <a:defRPr sz="1680"/>
+            <a:lvl2pPr marL="304815" indent="0">
+              <a:buNone/>
+              <a:defRPr sz="933"/>
             </a:lvl2pPr>
-            <a:lvl3pPr marL="1097280" indent="0">
-              <a:buNone/>
-              <a:defRPr sz="1440"/>
+            <a:lvl3pPr marL="609630" indent="0">
+              <a:buNone/>
+              <a:defRPr sz="800"/>
             </a:lvl3pPr>
-            <a:lvl4pPr marL="1645920" indent="0">
-              <a:buNone/>
-              <a:defRPr sz="1200"/>
+            <a:lvl4pPr marL="914446" indent="0">
+              <a:buNone/>
+              <a:defRPr sz="667"/>
             </a:lvl4pPr>
-            <a:lvl5pPr marL="2194560" indent="0">
-              <a:buNone/>
-              <a:defRPr sz="1200"/>
+            <a:lvl5pPr marL="1219261" indent="0">
+              <a:buNone/>
+              <a:defRPr sz="667"/>
             </a:lvl5pPr>
-            <a:lvl6pPr marL="2743200" indent="0">
-              <a:buNone/>
-              <a:defRPr sz="1200"/>
+            <a:lvl6pPr marL="1524076" indent="0">
+              <a:buNone/>
+              <a:defRPr sz="667"/>
             </a:lvl6pPr>
-            <a:lvl7pPr marL="3291840" indent="0">
-              <a:buNone/>
-              <a:defRPr sz="1200"/>
+            <a:lvl7pPr marL="1828891" indent="0">
+              <a:buNone/>
+              <a:defRPr sz="667"/>
             </a:lvl7pPr>
-            <a:lvl8pPr marL="3840480" indent="0">
-              <a:buNone/>
-              <a:defRPr sz="1200"/>
+            <a:lvl8pPr marL="2133707" indent="0">
+              <a:buNone/>
+              <a:defRPr sz="667"/>
             </a:lvl8pPr>
-            <a:lvl9pPr marL="4389120" indent="0">
-              <a:buNone/>
-              <a:defRPr sz="1200"/>
+            <a:lvl9pPr marL="2438522" indent="0">
+              <a:buNone/>
+              <a:defRPr sz="667"/>
             </a:lvl9pPr>
           </a:lstStyle>
           <a:p>
@@ -2364,7 +2360,7 @@
           <a:p>
             <a:fld id="{7B30DEEB-4051-4B0C-A7AF-4DAE803EFFB5}" type="datetimeFigureOut">
               <a:rPr lang="en-US" smtClean="0"/>
-              <a:t>10/5/2017</a:t>
+              <a:t>11/9/2017</a:t>
             </a:fld>
             <a:endParaRPr lang="en-US"/>
           </a:p>
@@ -2415,7 +2411,7 @@
     </p:spTree>
     <p:extLst>
       <p:ext uri="{BB962C8B-B14F-4D97-AF65-F5344CB8AC3E}">
-        <p14:creationId xmlns:p14="http://schemas.microsoft.com/office/powerpoint/2010/main" val="2494899338"/>
+        <p14:creationId xmlns:p14="http://schemas.microsoft.com/office/powerpoint/2010/main" val="2555676021"/>
       </p:ext>
     </p:extLst>
   </p:cSld>
@@ -2459,8 +2455,8 @@
         </p:nvSpPr>
         <p:spPr>
           <a:xfrm>
-            <a:off x="1320165" y="438150"/>
-            <a:ext cx="16562070" cy="1590676"/>
+            <a:off x="628650" y="243417"/>
+            <a:ext cx="7886700" cy="883709"/>
           </a:xfrm>
           <a:prstGeom prst="rect">
             <a:avLst/>
@@ -2492,8 +2488,8 @@
         </p:nvSpPr>
         <p:spPr>
           <a:xfrm>
-            <a:off x="1320165" y="2190750"/>
-            <a:ext cx="16562070" cy="5221606"/>
+            <a:off x="628650" y="1217083"/>
+            <a:ext cx="7886700" cy="2900892"/>
           </a:xfrm>
           <a:prstGeom prst="rect">
             <a:avLst/>
@@ -2554,8 +2550,8 @@
         </p:nvSpPr>
         <p:spPr>
           <a:xfrm>
-            <a:off x="1320165" y="7627621"/>
-            <a:ext cx="4320540" cy="438150"/>
+            <a:off x="628650" y="4237567"/>
+            <a:ext cx="2057400" cy="243417"/>
           </a:xfrm>
           <a:prstGeom prst="rect">
             <a:avLst/>
@@ -2565,7 +2561,7 @@
           <a:bodyPr vert="horz" lIns="91440" tIns="45720" rIns="91440" bIns="45720" rtlCol="0" anchor="ctr"/>
           <a:lstStyle>
             <a:lvl1pPr algn="l">
-              <a:defRPr sz="1440">
+              <a:defRPr sz="800">
                 <a:solidFill>
                   <a:schemeClr val="tx1">
                     <a:tint val="75000"/>
@@ -2577,7 +2573,7 @@
           <a:p>
             <a:fld id="{7B30DEEB-4051-4B0C-A7AF-4DAE803EFFB5}" type="datetimeFigureOut">
               <a:rPr lang="en-US" smtClean="0"/>
-              <a:t>10/5/2017</a:t>
+              <a:t>11/9/2017</a:t>
             </a:fld>
             <a:endParaRPr lang="en-US"/>
           </a:p>
@@ -2595,8 +2591,8 @@
         </p:nvSpPr>
         <p:spPr>
           <a:xfrm>
-            <a:off x="6360795" y="7627621"/>
-            <a:ext cx="6480810" cy="438150"/>
+            <a:off x="3028950" y="4237567"/>
+            <a:ext cx="3086100" cy="243417"/>
           </a:xfrm>
           <a:prstGeom prst="rect">
             <a:avLst/>
@@ -2606,7 +2602,7 @@
           <a:bodyPr vert="horz" lIns="91440" tIns="45720" rIns="91440" bIns="45720" rtlCol="0" anchor="ctr"/>
           <a:lstStyle>
             <a:lvl1pPr algn="ctr">
-              <a:defRPr sz="1440">
+              <a:defRPr sz="800">
                 <a:solidFill>
                   <a:schemeClr val="tx1">
                     <a:tint val="75000"/>
@@ -2632,8 +2628,8 @@
         </p:nvSpPr>
         <p:spPr>
           <a:xfrm>
-            <a:off x="13561695" y="7627621"/>
-            <a:ext cx="4320540" cy="438150"/>
+            <a:off x="6457950" y="4237567"/>
+            <a:ext cx="2057400" cy="243417"/>
           </a:xfrm>
           <a:prstGeom prst="rect">
             <a:avLst/>
@@ -2643,7 +2639,7 @@
           <a:bodyPr vert="horz" lIns="91440" tIns="45720" rIns="91440" bIns="45720" rtlCol="0" anchor="ctr"/>
           <a:lstStyle>
             <a:lvl1pPr algn="r">
-              <a:defRPr sz="1440">
+              <a:defRPr sz="800">
                 <a:solidFill>
                   <a:schemeClr val="tx1">
                     <a:tint val="75000"/>
@@ -2664,27 +2660,27 @@
     </p:spTree>
     <p:extLst>
       <p:ext uri="{BB962C8B-B14F-4D97-AF65-F5344CB8AC3E}">
-        <p14:creationId xmlns:p14="http://schemas.microsoft.com/office/powerpoint/2010/main" val="1345167897"/>
+        <p14:creationId xmlns:p14="http://schemas.microsoft.com/office/powerpoint/2010/main" val="869980764"/>
       </p:ext>
     </p:extLst>
   </p:cSld>
   <p:clrMap bg1="lt1" tx1="dk1" bg2="lt2" tx2="dk2" accent1="accent1" accent2="accent2" accent3="accent3" accent4="accent4" accent5="accent5" accent6="accent6" hlink="hlink" folHlink="folHlink"/>
   <p:sldLayoutIdLst>
-    <p:sldLayoutId id="2147483661" r:id="rId1"/>
-    <p:sldLayoutId id="2147483662" r:id="rId2"/>
-    <p:sldLayoutId id="2147483663" r:id="rId3"/>
-    <p:sldLayoutId id="2147483664" r:id="rId4"/>
-    <p:sldLayoutId id="2147483665" r:id="rId5"/>
-    <p:sldLayoutId id="2147483666" r:id="rId6"/>
-    <p:sldLayoutId id="2147483667" r:id="rId7"/>
-    <p:sldLayoutId id="2147483668" r:id="rId8"/>
-    <p:sldLayoutId id="2147483669" r:id="rId9"/>
-    <p:sldLayoutId id="2147483670" r:id="rId10"/>
-    <p:sldLayoutId id="2147483671" r:id="rId11"/>
+    <p:sldLayoutId id="2147483697" r:id="rId1"/>
+    <p:sldLayoutId id="2147483698" r:id="rId2"/>
+    <p:sldLayoutId id="2147483699" r:id="rId3"/>
+    <p:sldLayoutId id="2147483700" r:id="rId4"/>
+    <p:sldLayoutId id="2147483701" r:id="rId5"/>
+    <p:sldLayoutId id="2147483702" r:id="rId6"/>
+    <p:sldLayoutId id="2147483703" r:id="rId7"/>
+    <p:sldLayoutId id="2147483704" r:id="rId8"/>
+    <p:sldLayoutId id="2147483705" r:id="rId9"/>
+    <p:sldLayoutId id="2147483706" r:id="rId10"/>
+    <p:sldLayoutId id="2147483707" r:id="rId11"/>
   </p:sldLayoutIdLst>
   <p:txStyles>
     <p:titleStyle>
-      <a:lvl1pPr algn="l" defTabSz="1097280" rtl="0" eaLnBrk="1" latinLnBrk="0" hangingPunct="1">
+      <a:lvl1pPr algn="l" defTabSz="609630" rtl="0" eaLnBrk="1" latinLnBrk="0" hangingPunct="1">
         <a:lnSpc>
           <a:spcPct val="90000"/>
         </a:lnSpc>
@@ -2692,7 +2688,7 @@
           <a:spcPct val="0"/>
         </a:spcBef>
         <a:buNone/>
-        <a:defRPr sz="5280" kern="1200">
+        <a:defRPr sz="2933" kern="1200">
           <a:solidFill>
             <a:schemeClr val="tx1"/>
           </a:solidFill>
@@ -2703,16 +2699,16 @@
       </a:lvl1pPr>
     </p:titleStyle>
     <p:bodyStyle>
-      <a:lvl1pPr marL="274320" indent="-274320" algn="l" defTabSz="1097280" rtl="0" eaLnBrk="1" latinLnBrk="0" hangingPunct="1">
+      <a:lvl1pPr marL="152408" indent="-152408" algn="l" defTabSz="609630" rtl="0" eaLnBrk="1" latinLnBrk="0" hangingPunct="1">
         <a:lnSpc>
           <a:spcPct val="90000"/>
         </a:lnSpc>
         <a:spcBef>
-          <a:spcPts val="1200"/>
+          <a:spcPts val="667"/>
         </a:spcBef>
         <a:buFont typeface="Arial" panose="020B0604020202020204" pitchFamily="34" charset="0"/>
         <a:buChar char="•"/>
-        <a:defRPr sz="3360" kern="1200">
+        <a:defRPr sz="1867" kern="1200">
           <a:solidFill>
             <a:schemeClr val="tx1"/>
           </a:solidFill>
@@ -2721,16 +2717,16 @@
           <a:cs typeface="+mn-cs"/>
         </a:defRPr>
       </a:lvl1pPr>
-      <a:lvl2pPr marL="822960" indent="-274320" algn="l" defTabSz="1097280" rtl="0" eaLnBrk="1" latinLnBrk="0" hangingPunct="1">
+      <a:lvl2pPr marL="457223" indent="-152408" algn="l" defTabSz="609630" rtl="0" eaLnBrk="1" latinLnBrk="0" hangingPunct="1">
         <a:lnSpc>
           <a:spcPct val="90000"/>
         </a:lnSpc>
         <a:spcBef>
-          <a:spcPts val="600"/>
+          <a:spcPts val="333"/>
         </a:spcBef>
         <a:buFont typeface="Arial" panose="020B0604020202020204" pitchFamily="34" charset="0"/>
         <a:buChar char="•"/>
-        <a:defRPr sz="2880" kern="1200">
+        <a:defRPr sz="1600" kern="1200">
           <a:solidFill>
             <a:schemeClr val="tx1"/>
           </a:solidFill>
@@ -2739,16 +2735,16 @@
           <a:cs typeface="+mn-cs"/>
         </a:defRPr>
       </a:lvl2pPr>
-      <a:lvl3pPr marL="1371600" indent="-274320" algn="l" defTabSz="1097280" rtl="0" eaLnBrk="1" latinLnBrk="0" hangingPunct="1">
+      <a:lvl3pPr marL="762038" indent="-152408" algn="l" defTabSz="609630" rtl="0" eaLnBrk="1" latinLnBrk="0" hangingPunct="1">
         <a:lnSpc>
           <a:spcPct val="90000"/>
         </a:lnSpc>
         <a:spcBef>
-          <a:spcPts val="600"/>
+          <a:spcPts val="333"/>
         </a:spcBef>
         <a:buFont typeface="Arial" panose="020B0604020202020204" pitchFamily="34" charset="0"/>
         <a:buChar char="•"/>
-        <a:defRPr sz="2400" kern="1200">
+        <a:defRPr sz="1333" kern="1200">
           <a:solidFill>
             <a:schemeClr val="tx1"/>
           </a:solidFill>
@@ -2757,16 +2753,16 @@
           <a:cs typeface="+mn-cs"/>
         </a:defRPr>
       </a:lvl3pPr>
-      <a:lvl4pPr marL="1920240" indent="-274320" algn="l" defTabSz="1097280" rtl="0" eaLnBrk="1" latinLnBrk="0" hangingPunct="1">
+      <a:lvl4pPr marL="1066853" indent="-152408" algn="l" defTabSz="609630" rtl="0" eaLnBrk="1" latinLnBrk="0" hangingPunct="1">
         <a:lnSpc>
           <a:spcPct val="90000"/>
         </a:lnSpc>
         <a:spcBef>
-          <a:spcPts val="600"/>
+          <a:spcPts val="333"/>
         </a:spcBef>
         <a:buFont typeface="Arial" panose="020B0604020202020204" pitchFamily="34" charset="0"/>
         <a:buChar char="•"/>
-        <a:defRPr sz="2160" kern="1200">
+        <a:defRPr sz="1200" kern="1200">
           <a:solidFill>
             <a:schemeClr val="tx1"/>
           </a:solidFill>
@@ -2775,16 +2771,16 @@
           <a:cs typeface="+mn-cs"/>
         </a:defRPr>
       </a:lvl4pPr>
-      <a:lvl5pPr marL="2468880" indent="-274320" algn="l" defTabSz="1097280" rtl="0" eaLnBrk="1" latinLnBrk="0" hangingPunct="1">
+      <a:lvl5pPr marL="1371669" indent="-152408" algn="l" defTabSz="609630" rtl="0" eaLnBrk="1" latinLnBrk="0" hangingPunct="1">
         <a:lnSpc>
           <a:spcPct val="90000"/>
         </a:lnSpc>
         <a:spcBef>
-          <a:spcPts val="600"/>
+          <a:spcPts val="333"/>
         </a:spcBef>
         <a:buFont typeface="Arial" panose="020B0604020202020204" pitchFamily="34" charset="0"/>
         <a:buChar char="•"/>
-        <a:defRPr sz="2160" kern="1200">
+        <a:defRPr sz="1200" kern="1200">
           <a:solidFill>
             <a:schemeClr val="tx1"/>
           </a:solidFill>
@@ -2793,16 +2789,16 @@
           <a:cs typeface="+mn-cs"/>
         </a:defRPr>
       </a:lvl5pPr>
-      <a:lvl6pPr marL="3017520" indent="-274320" algn="l" defTabSz="1097280" rtl="0" eaLnBrk="1" latinLnBrk="0" hangingPunct="1">
+      <a:lvl6pPr marL="1676484" indent="-152408" algn="l" defTabSz="609630" rtl="0" eaLnBrk="1" latinLnBrk="0" hangingPunct="1">
         <a:lnSpc>
           <a:spcPct val="90000"/>
         </a:lnSpc>
         <a:spcBef>
-          <a:spcPts val="600"/>
+          <a:spcPts val="333"/>
         </a:spcBef>
         <a:buFont typeface="Arial" panose="020B0604020202020204" pitchFamily="34" charset="0"/>
         <a:buChar char="•"/>
-        <a:defRPr sz="2160" kern="1200">
+        <a:defRPr sz="1200" kern="1200">
           <a:solidFill>
             <a:schemeClr val="tx1"/>
           </a:solidFill>
@@ -2811,16 +2807,16 @@
           <a:cs typeface="+mn-cs"/>
         </a:defRPr>
       </a:lvl6pPr>
-      <a:lvl7pPr marL="3566160" indent="-274320" algn="l" defTabSz="1097280" rtl="0" eaLnBrk="1" latinLnBrk="0" hangingPunct="1">
+      <a:lvl7pPr marL="1981299" indent="-152408" algn="l" defTabSz="609630" rtl="0" eaLnBrk="1" latinLnBrk="0" hangingPunct="1">
         <a:lnSpc>
           <a:spcPct val="90000"/>
         </a:lnSpc>
         <a:spcBef>
-          <a:spcPts val="600"/>
+          <a:spcPts val="333"/>
         </a:spcBef>
         <a:buFont typeface="Arial" panose="020B0604020202020204" pitchFamily="34" charset="0"/>
         <a:buChar char="•"/>
-        <a:defRPr sz="2160" kern="1200">
+        <a:defRPr sz="1200" kern="1200">
           <a:solidFill>
             <a:schemeClr val="tx1"/>
           </a:solidFill>
@@ -2829,16 +2825,16 @@
           <a:cs typeface="+mn-cs"/>
         </a:defRPr>
       </a:lvl7pPr>
-      <a:lvl8pPr marL="4114800" indent="-274320" algn="l" defTabSz="1097280" rtl="0" eaLnBrk="1" latinLnBrk="0" hangingPunct="1">
+      <a:lvl8pPr marL="2286114" indent="-152408" algn="l" defTabSz="609630" rtl="0" eaLnBrk="1" latinLnBrk="0" hangingPunct="1">
         <a:lnSpc>
           <a:spcPct val="90000"/>
         </a:lnSpc>
         <a:spcBef>
-          <a:spcPts val="600"/>
+          <a:spcPts val="333"/>
         </a:spcBef>
         <a:buFont typeface="Arial" panose="020B0604020202020204" pitchFamily="34" charset="0"/>
         <a:buChar char="•"/>
-        <a:defRPr sz="2160" kern="1200">
+        <a:defRPr sz="1200" kern="1200">
           <a:solidFill>
             <a:schemeClr val="tx1"/>
           </a:solidFill>
@@ -2847,16 +2843,16 @@
           <a:cs typeface="+mn-cs"/>
         </a:defRPr>
       </a:lvl8pPr>
-      <a:lvl9pPr marL="4663440" indent="-274320" algn="l" defTabSz="1097280" rtl="0" eaLnBrk="1" latinLnBrk="0" hangingPunct="1">
+      <a:lvl9pPr marL="2590930" indent="-152408" algn="l" defTabSz="609630" rtl="0" eaLnBrk="1" latinLnBrk="0" hangingPunct="1">
         <a:lnSpc>
           <a:spcPct val="90000"/>
         </a:lnSpc>
         <a:spcBef>
-          <a:spcPts val="600"/>
+          <a:spcPts val="333"/>
         </a:spcBef>
         <a:buFont typeface="Arial" panose="020B0604020202020204" pitchFamily="34" charset="0"/>
         <a:buChar char="•"/>
-        <a:defRPr sz="2160" kern="1200">
+        <a:defRPr sz="1200" kern="1200">
           <a:solidFill>
             <a:schemeClr val="tx1"/>
           </a:solidFill>
@@ -2870,8 +2866,8 @@
       <a:defPPr>
         <a:defRPr lang="en-US"/>
       </a:defPPr>
-      <a:lvl1pPr marL="0" algn="l" defTabSz="1097280" rtl="0" eaLnBrk="1" latinLnBrk="0" hangingPunct="1">
-        <a:defRPr sz="2160" kern="1200">
+      <a:lvl1pPr marL="0" algn="l" defTabSz="609630" rtl="0" eaLnBrk="1" latinLnBrk="0" hangingPunct="1">
+        <a:defRPr sz="1200" kern="1200">
           <a:solidFill>
             <a:schemeClr val="tx1"/>
           </a:solidFill>
@@ -2880,8 +2876,8 @@
           <a:cs typeface="+mn-cs"/>
         </a:defRPr>
       </a:lvl1pPr>
-      <a:lvl2pPr marL="548640" algn="l" defTabSz="1097280" rtl="0" eaLnBrk="1" latinLnBrk="0" hangingPunct="1">
-        <a:defRPr sz="2160" kern="1200">
+      <a:lvl2pPr marL="304815" algn="l" defTabSz="609630" rtl="0" eaLnBrk="1" latinLnBrk="0" hangingPunct="1">
+        <a:defRPr sz="1200" kern="1200">
           <a:solidFill>
             <a:schemeClr val="tx1"/>
           </a:solidFill>
@@ -2890,8 +2886,8 @@
           <a:cs typeface="+mn-cs"/>
         </a:defRPr>
       </a:lvl2pPr>
-      <a:lvl3pPr marL="1097280" algn="l" defTabSz="1097280" rtl="0" eaLnBrk="1" latinLnBrk="0" hangingPunct="1">
-        <a:defRPr sz="2160" kern="1200">
+      <a:lvl3pPr marL="609630" algn="l" defTabSz="609630" rtl="0" eaLnBrk="1" latinLnBrk="0" hangingPunct="1">
+        <a:defRPr sz="1200" kern="1200">
           <a:solidFill>
             <a:schemeClr val="tx1"/>
           </a:solidFill>
@@ -2900,8 +2896,8 @@
           <a:cs typeface="+mn-cs"/>
         </a:defRPr>
       </a:lvl3pPr>
-      <a:lvl4pPr marL="1645920" algn="l" defTabSz="1097280" rtl="0" eaLnBrk="1" latinLnBrk="0" hangingPunct="1">
-        <a:defRPr sz="2160" kern="1200">
+      <a:lvl4pPr marL="914446" algn="l" defTabSz="609630" rtl="0" eaLnBrk="1" latinLnBrk="0" hangingPunct="1">
+        <a:defRPr sz="1200" kern="1200">
           <a:solidFill>
             <a:schemeClr val="tx1"/>
           </a:solidFill>
@@ -2910,8 +2906,8 @@
           <a:cs typeface="+mn-cs"/>
         </a:defRPr>
       </a:lvl4pPr>
-      <a:lvl5pPr marL="2194560" algn="l" defTabSz="1097280" rtl="0" eaLnBrk="1" latinLnBrk="0" hangingPunct="1">
-        <a:defRPr sz="2160" kern="1200">
+      <a:lvl5pPr marL="1219261" algn="l" defTabSz="609630" rtl="0" eaLnBrk="1" latinLnBrk="0" hangingPunct="1">
+        <a:defRPr sz="1200" kern="1200">
           <a:solidFill>
             <a:schemeClr val="tx1"/>
           </a:solidFill>
@@ -2920,8 +2916,8 @@
           <a:cs typeface="+mn-cs"/>
         </a:defRPr>
       </a:lvl5pPr>
-      <a:lvl6pPr marL="2743200" algn="l" defTabSz="1097280" rtl="0" eaLnBrk="1" latinLnBrk="0" hangingPunct="1">
-        <a:defRPr sz="2160" kern="1200">
+      <a:lvl6pPr marL="1524076" algn="l" defTabSz="609630" rtl="0" eaLnBrk="1" latinLnBrk="0" hangingPunct="1">
+        <a:defRPr sz="1200" kern="1200">
           <a:solidFill>
             <a:schemeClr val="tx1"/>
           </a:solidFill>
@@ -2930,8 +2926,8 @@
           <a:cs typeface="+mn-cs"/>
         </a:defRPr>
       </a:lvl6pPr>
-      <a:lvl7pPr marL="3291840" algn="l" defTabSz="1097280" rtl="0" eaLnBrk="1" latinLnBrk="0" hangingPunct="1">
-        <a:defRPr sz="2160" kern="1200">
+      <a:lvl7pPr marL="1828891" algn="l" defTabSz="609630" rtl="0" eaLnBrk="1" latinLnBrk="0" hangingPunct="1">
+        <a:defRPr sz="1200" kern="1200">
           <a:solidFill>
             <a:schemeClr val="tx1"/>
           </a:solidFill>
@@ -2940,8 +2936,8 @@
           <a:cs typeface="+mn-cs"/>
         </a:defRPr>
       </a:lvl7pPr>
-      <a:lvl8pPr marL="3840480" algn="l" defTabSz="1097280" rtl="0" eaLnBrk="1" latinLnBrk="0" hangingPunct="1">
-        <a:defRPr sz="2160" kern="1200">
+      <a:lvl8pPr marL="2133707" algn="l" defTabSz="609630" rtl="0" eaLnBrk="1" latinLnBrk="0" hangingPunct="1">
+        <a:defRPr sz="1200" kern="1200">
           <a:solidFill>
             <a:schemeClr val="tx1"/>
           </a:solidFill>
@@ -2950,8 +2946,8 @@
           <a:cs typeface="+mn-cs"/>
         </a:defRPr>
       </a:lvl8pPr>
-      <a:lvl9pPr marL="4389120" algn="l" defTabSz="1097280" rtl="0" eaLnBrk="1" latinLnBrk="0" hangingPunct="1">
-        <a:defRPr sz="2160" kern="1200">
+      <a:lvl9pPr marL="2438522" algn="l" defTabSz="609630" rtl="0" eaLnBrk="1" latinLnBrk="0" hangingPunct="1">
+        <a:defRPr sz="1200" kern="1200">
           <a:solidFill>
             <a:schemeClr val="tx1"/>
           </a:solidFill>
@@ -3009,80 +3005,6 @@
 </p:sld>
 </file>
 
-<file path=ppt/slides/slide10.xml><?xml version="1.0" encoding="utf-8"?>
-<p:sld xmlns:a="http://schemas.openxmlformats.org/drawingml/2006/main" xmlns:r="http://schemas.openxmlformats.org/officeDocument/2006/relationships" xmlns:p="http://schemas.openxmlformats.org/presentationml/2006/main">
-  <p:cSld>
-    <p:bg>
-      <p:bgPr>
-        <a:blipFill dpi="0" rotWithShape="1">
-          <a:blip r:embed="rId2">
-            <a:lum/>
-          </a:blip>
-          <a:srcRect/>
-          <a:stretch>
-            <a:fillRect t="-38000" b="-38000"/>
-          </a:stretch>
-        </a:blipFill>
-        <a:effectLst/>
-      </p:bgPr>
-    </p:bg>
-    <p:spTree>
-      <p:nvGrpSpPr>
-        <p:cNvPr id="1" name=""/>
-        <p:cNvGrpSpPr/>
-        <p:nvPr/>
-      </p:nvGrpSpPr>
-      <p:grpSpPr>
-        <a:xfrm>
-          <a:off x="0" y="0"/>
-          <a:ext cx="0" cy="0"/>
-          <a:chOff x="0" y="0"/>
-          <a:chExt cx="0" cy="0"/>
-        </a:xfrm>
-      </p:grpSpPr>
-      <p:pic>
-        <p:nvPicPr>
-          <p:cNvPr id="2" name="Picture 1"/>
-          <p:cNvPicPr>
-            <a:picLocks noChangeAspect="1"/>
-          </p:cNvPicPr>
-          <p:nvPr/>
-        </p:nvPicPr>
-        <p:blipFill>
-          <a:blip r:embed="rId3" cstate="print">
-            <a:extLst>
-              <a:ext uri="{28A0092B-C50C-407E-A947-70E740481C1C}">
-                <a14:useLocalDpi xmlns:a14="http://schemas.microsoft.com/office/drawing/2010/main" val="0"/>
-              </a:ext>
-            </a:extLst>
-          </a:blip>
-          <a:stretch>
-            <a:fillRect/>
-          </a:stretch>
-        </p:blipFill>
-        <p:spPr>
-          <a:xfrm>
-            <a:off x="5349239" y="902208"/>
-            <a:ext cx="8503922" cy="6425184"/>
-          </a:xfrm>
-          <a:prstGeom prst="rect">
-            <a:avLst/>
-          </a:prstGeom>
-        </p:spPr>
-      </p:pic>
-    </p:spTree>
-    <p:extLst>
-      <p:ext uri="{BB962C8B-B14F-4D97-AF65-F5344CB8AC3E}">
-        <p14:creationId xmlns:p14="http://schemas.microsoft.com/office/powerpoint/2010/main" val="2628737580"/>
-      </p:ext>
-    </p:extLst>
-  </p:cSld>
-  <p:clrMapOvr>
-    <a:masterClrMapping/>
-  </p:clrMapOvr>
-</p:sld>
-</file>
-
 <file path=ppt/slides/slide2.xml><?xml version="1.0" encoding="utf-8"?>
 <p:sld xmlns:a="http://schemas.openxmlformats.org/drawingml/2006/main" xmlns:r="http://schemas.openxmlformats.org/officeDocument/2006/relationships" xmlns:p="http://schemas.openxmlformats.org/presentationml/2006/main">
   <p:cSld>
@@ -3094,7 +3016,7 @@
           </a:blip>
           <a:srcRect/>
           <a:stretch>
-            <a:fillRect t="-4000" b="-4000"/>
+            <a:fillRect/>
           </a:stretch>
         </a:blipFill>
         <a:effectLst/>
@@ -3117,7 +3039,7 @@
     </p:spTree>
     <p:extLst>
       <p:ext uri="{BB962C8B-B14F-4D97-AF65-F5344CB8AC3E}">
-        <p14:creationId xmlns:p14="http://schemas.microsoft.com/office/powerpoint/2010/main" val="2826992780"/>
+        <p14:creationId xmlns:p14="http://schemas.microsoft.com/office/powerpoint/2010/main" val="2900482167"/>
       </p:ext>
     </p:extLst>
   </p:cSld>
@@ -3161,7 +3083,7 @@
     </p:spTree>
     <p:extLst>
       <p:ext uri="{BB962C8B-B14F-4D97-AF65-F5344CB8AC3E}">
-        <p14:creationId xmlns:p14="http://schemas.microsoft.com/office/powerpoint/2010/main" val="2671892939"/>
+        <p14:creationId xmlns:p14="http://schemas.microsoft.com/office/powerpoint/2010/main" val="2299078543"/>
       </p:ext>
     </p:extLst>
   </p:cSld>
@@ -3205,7 +3127,7 @@
     </p:spTree>
     <p:extLst>
       <p:ext uri="{BB962C8B-B14F-4D97-AF65-F5344CB8AC3E}">
-        <p14:creationId xmlns:p14="http://schemas.microsoft.com/office/powerpoint/2010/main" val="2900482167"/>
+        <p14:creationId xmlns:p14="http://schemas.microsoft.com/office/powerpoint/2010/main" val="1948486287"/>
       </p:ext>
     </p:extLst>
   </p:cSld>
@@ -3216,138 +3138,6 @@
 </file>
 
 <file path=ppt/slides/slide5.xml><?xml version="1.0" encoding="utf-8"?>
-<p:sld xmlns:a="http://schemas.openxmlformats.org/drawingml/2006/main" xmlns:r="http://schemas.openxmlformats.org/officeDocument/2006/relationships" xmlns:p="http://schemas.openxmlformats.org/presentationml/2006/main">
-  <p:cSld>
-    <p:bg>
-      <p:bgPr>
-        <a:blipFill dpi="0" rotWithShape="1">
-          <a:blip r:embed="rId2">
-            <a:lum/>
-          </a:blip>
-          <a:srcRect/>
-          <a:stretch>
-            <a:fillRect l="-2000" r="-2000"/>
-          </a:stretch>
-        </a:blipFill>
-        <a:effectLst/>
-      </p:bgPr>
-    </p:bg>
-    <p:spTree>
-      <p:nvGrpSpPr>
-        <p:cNvPr id="1" name=""/>
-        <p:cNvGrpSpPr/>
-        <p:nvPr/>
-      </p:nvGrpSpPr>
-      <p:grpSpPr>
-        <a:xfrm>
-          <a:off x="0" y="0"/>
-          <a:ext cx="0" cy="0"/>
-          <a:chOff x="0" y="0"/>
-          <a:chExt cx="0" cy="0"/>
-        </a:xfrm>
-      </p:grpSpPr>
-    </p:spTree>
-    <p:extLst>
-      <p:ext uri="{BB962C8B-B14F-4D97-AF65-F5344CB8AC3E}">
-        <p14:creationId xmlns:p14="http://schemas.microsoft.com/office/powerpoint/2010/main" val="2299078543"/>
-      </p:ext>
-    </p:extLst>
-  </p:cSld>
-  <p:clrMapOvr>
-    <a:masterClrMapping/>
-  </p:clrMapOvr>
-</p:sld>
-</file>
-
-<file path=ppt/slides/slide6.xml><?xml version="1.0" encoding="utf-8"?>
-<p:sld xmlns:a="http://schemas.openxmlformats.org/drawingml/2006/main" xmlns:r="http://schemas.openxmlformats.org/officeDocument/2006/relationships" xmlns:p="http://schemas.openxmlformats.org/presentationml/2006/main">
-  <p:cSld>
-    <p:bg>
-      <p:bgPr>
-        <a:blipFill dpi="0" rotWithShape="1">
-          <a:blip r:embed="rId2">
-            <a:lum/>
-          </a:blip>
-          <a:srcRect/>
-          <a:stretch>
-            <a:fillRect l="-10000" r="-10000"/>
-          </a:stretch>
-        </a:blipFill>
-        <a:effectLst/>
-      </p:bgPr>
-    </p:bg>
-    <p:spTree>
-      <p:nvGrpSpPr>
-        <p:cNvPr id="1" name=""/>
-        <p:cNvGrpSpPr/>
-        <p:nvPr/>
-      </p:nvGrpSpPr>
-      <p:grpSpPr>
-        <a:xfrm>
-          <a:off x="0" y="0"/>
-          <a:ext cx="0" cy="0"/>
-          <a:chOff x="0" y="0"/>
-          <a:chExt cx="0" cy="0"/>
-        </a:xfrm>
-      </p:grpSpPr>
-    </p:spTree>
-    <p:extLst>
-      <p:ext uri="{BB962C8B-B14F-4D97-AF65-F5344CB8AC3E}">
-        <p14:creationId xmlns:p14="http://schemas.microsoft.com/office/powerpoint/2010/main" val="407647110"/>
-      </p:ext>
-    </p:extLst>
-  </p:cSld>
-  <p:clrMapOvr>
-    <a:masterClrMapping/>
-  </p:clrMapOvr>
-</p:sld>
-</file>
-
-<file path=ppt/slides/slide7.xml><?xml version="1.0" encoding="utf-8"?>
-<p:sld xmlns:a="http://schemas.openxmlformats.org/drawingml/2006/main" xmlns:r="http://schemas.openxmlformats.org/officeDocument/2006/relationships" xmlns:p="http://schemas.openxmlformats.org/presentationml/2006/main">
-  <p:cSld>
-    <p:bg>
-      <p:bgPr>
-        <a:blipFill dpi="0" rotWithShape="1">
-          <a:blip r:embed="rId2">
-            <a:lum/>
-          </a:blip>
-          <a:srcRect/>
-          <a:stretch>
-            <a:fillRect/>
-          </a:stretch>
-        </a:blipFill>
-        <a:effectLst/>
-      </p:bgPr>
-    </p:bg>
-    <p:spTree>
-      <p:nvGrpSpPr>
-        <p:cNvPr id="1" name=""/>
-        <p:cNvGrpSpPr/>
-        <p:nvPr/>
-      </p:nvGrpSpPr>
-      <p:grpSpPr>
-        <a:xfrm>
-          <a:off x="0" y="0"/>
-          <a:ext cx="0" cy="0"/>
-          <a:chOff x="0" y="0"/>
-          <a:chExt cx="0" cy="0"/>
-        </a:xfrm>
-      </p:grpSpPr>
-    </p:spTree>
-    <p:extLst>
-      <p:ext uri="{BB962C8B-B14F-4D97-AF65-F5344CB8AC3E}">
-        <p14:creationId xmlns:p14="http://schemas.microsoft.com/office/powerpoint/2010/main" val="1948486287"/>
-      </p:ext>
-    </p:extLst>
-  </p:cSld>
-  <p:clrMapOvr>
-    <a:masterClrMapping/>
-  </p:clrMapOvr>
-</p:sld>
-</file>
-
-<file path=ppt/slides/slide8.xml><?xml version="1.0" encoding="utf-8"?>
 <p:sld xmlns:a="http://schemas.openxmlformats.org/drawingml/2006/main" xmlns:r="http://schemas.openxmlformats.org/officeDocument/2006/relationships" xmlns:p="http://schemas.openxmlformats.org/presentationml/2006/main">
   <p:cSld>
     <p:bg>
@@ -3391,7 +3181,7 @@
 </p:sld>
 </file>
 
-<file path=ppt/slides/slide9.xml><?xml version="1.0" encoding="utf-8"?>
+<file path=ppt/slides/slide6.xml><?xml version="1.0" encoding="utf-8"?>
 <p:sld xmlns:a="http://schemas.openxmlformats.org/drawingml/2006/main" xmlns:r="http://schemas.openxmlformats.org/officeDocument/2006/relationships" xmlns:p="http://schemas.openxmlformats.org/presentationml/2006/main">
   <p:cSld>
     <p:bg>

</xml_diff>

<commit_message>
style.css  - comments made more visible  - components arranged in alphabetical order
added light-green color
added divider

container - max-width changed to 1200px

btn
 - added black color, font-size changed to 15px, added text-align center
 - added btn block and btn outline

card
 - removed border
 - added border-radius
 - card-img added border-radius

dropdown
 - removed rotate
 - removed dropdown-btn
 - removed direct menu

dropdown-content - max-height: calc(100vh - 32px)

menu
 - added vertical menu
 - menu-item and link height:48px

menubar
 - min-height 56px, (min-height 64px on desktop)
 - removed border-bottom
 - removed menu-brand
 - removed menu-toggler
 - menu-logo height:48px and (height 56px on desktop)
 - menu-logo img max-height:100%

sidenav (renamed collapse-sidenav)
 - width changed to 300px
 - background-color changed to white
 - added sidenav-header
 - added sidenav-title
 - removed h2 styling

style changes changed in the html files accordingly
</commit_message>
<xml_diff>
--- a/img/ppt/carousel-images.pptx
+++ b/img/ppt/carousel-images.pptx
@@ -8,9 +8,7 @@
     <p:sldId id="256" r:id="rId2"/>
     <p:sldId id="263" r:id="rId3"/>
     <p:sldId id="258" r:id="rId4"/>
-    <p:sldId id="259" r:id="rId5"/>
-    <p:sldId id="260" r:id="rId6"/>
-    <p:sldId id="261" r:id="rId7"/>
+    <p:sldId id="260" r:id="rId5"/>
   </p:sldIdLst>
   <p:sldSz cx="9144000" cy="4572000"/>
   <p:notesSz cx="6858000" cy="9144000"/>
@@ -248,7 +246,7 @@
           <a:p>
             <a:fld id="{7B30DEEB-4051-4B0C-A7AF-4DAE803EFFB5}" type="datetimeFigureOut">
               <a:rPr lang="en-US" smtClean="0"/>
-              <a:t>11/9/2017</a:t>
+              <a:t>11/19/2017</a:t>
             </a:fld>
             <a:endParaRPr lang="en-US"/>
           </a:p>
@@ -418,7 +416,7 @@
           <a:p>
             <a:fld id="{7B30DEEB-4051-4B0C-A7AF-4DAE803EFFB5}" type="datetimeFigureOut">
               <a:rPr lang="en-US" smtClean="0"/>
-              <a:t>11/9/2017</a:t>
+              <a:t>11/19/2017</a:t>
             </a:fld>
             <a:endParaRPr lang="en-US"/>
           </a:p>
@@ -598,7 +596,7 @@
           <a:p>
             <a:fld id="{7B30DEEB-4051-4B0C-A7AF-4DAE803EFFB5}" type="datetimeFigureOut">
               <a:rPr lang="en-US" smtClean="0"/>
-              <a:t>11/9/2017</a:t>
+              <a:t>11/19/2017</a:t>
             </a:fld>
             <a:endParaRPr lang="en-US"/>
           </a:p>
@@ -768,7 +766,7 @@
           <a:p>
             <a:fld id="{7B30DEEB-4051-4B0C-A7AF-4DAE803EFFB5}" type="datetimeFigureOut">
               <a:rPr lang="en-US" smtClean="0"/>
-              <a:t>11/9/2017</a:t>
+              <a:t>11/19/2017</a:t>
             </a:fld>
             <a:endParaRPr lang="en-US"/>
           </a:p>
@@ -1014,7 +1012,7 @@
           <a:p>
             <a:fld id="{7B30DEEB-4051-4B0C-A7AF-4DAE803EFFB5}" type="datetimeFigureOut">
               <a:rPr lang="en-US" smtClean="0"/>
-              <a:t>11/9/2017</a:t>
+              <a:t>11/19/2017</a:t>
             </a:fld>
             <a:endParaRPr lang="en-US"/>
           </a:p>
@@ -1246,7 +1244,7 @@
           <a:p>
             <a:fld id="{7B30DEEB-4051-4B0C-A7AF-4DAE803EFFB5}" type="datetimeFigureOut">
               <a:rPr lang="en-US" smtClean="0"/>
-              <a:t>11/9/2017</a:t>
+              <a:t>11/19/2017</a:t>
             </a:fld>
             <a:endParaRPr lang="en-US"/>
           </a:p>
@@ -1613,7 +1611,7 @@
           <a:p>
             <a:fld id="{7B30DEEB-4051-4B0C-A7AF-4DAE803EFFB5}" type="datetimeFigureOut">
               <a:rPr lang="en-US" smtClean="0"/>
-              <a:t>11/9/2017</a:t>
+              <a:t>11/19/2017</a:t>
             </a:fld>
             <a:endParaRPr lang="en-US"/>
           </a:p>
@@ -1731,7 +1729,7 @@
           <a:p>
             <a:fld id="{7B30DEEB-4051-4B0C-A7AF-4DAE803EFFB5}" type="datetimeFigureOut">
               <a:rPr lang="en-US" smtClean="0"/>
-              <a:t>11/9/2017</a:t>
+              <a:t>11/19/2017</a:t>
             </a:fld>
             <a:endParaRPr lang="en-US"/>
           </a:p>
@@ -1826,7 +1824,7 @@
           <a:p>
             <a:fld id="{7B30DEEB-4051-4B0C-A7AF-4DAE803EFFB5}" type="datetimeFigureOut">
               <a:rPr lang="en-US" smtClean="0"/>
-              <a:t>11/9/2017</a:t>
+              <a:t>11/19/2017</a:t>
             </a:fld>
             <a:endParaRPr lang="en-US"/>
           </a:p>
@@ -2103,7 +2101,7 @@
           <a:p>
             <a:fld id="{7B30DEEB-4051-4B0C-A7AF-4DAE803EFFB5}" type="datetimeFigureOut">
               <a:rPr lang="en-US" smtClean="0"/>
-              <a:t>11/9/2017</a:t>
+              <a:t>11/19/2017</a:t>
             </a:fld>
             <a:endParaRPr lang="en-US"/>
           </a:p>
@@ -2360,7 +2358,7 @@
           <a:p>
             <a:fld id="{7B30DEEB-4051-4B0C-A7AF-4DAE803EFFB5}" type="datetimeFigureOut">
               <a:rPr lang="en-US" smtClean="0"/>
-              <a:t>11/9/2017</a:t>
+              <a:t>11/19/2017</a:t>
             </a:fld>
             <a:endParaRPr lang="en-US"/>
           </a:p>
@@ -2573,7 +2571,7 @@
           <a:p>
             <a:fld id="{7B30DEEB-4051-4B0C-A7AF-4DAE803EFFB5}" type="datetimeFigureOut">
               <a:rPr lang="en-US" smtClean="0"/>
-              <a:t>11/9/2017</a:t>
+              <a:t>11/19/2017</a:t>
             </a:fld>
             <a:endParaRPr lang="en-US"/>
           </a:p>
@@ -3104,50 +3102,6 @@
           </a:blip>
           <a:srcRect/>
           <a:stretch>
-            <a:fillRect/>
-          </a:stretch>
-        </a:blipFill>
-        <a:effectLst/>
-      </p:bgPr>
-    </p:bg>
-    <p:spTree>
-      <p:nvGrpSpPr>
-        <p:cNvPr id="1" name=""/>
-        <p:cNvGrpSpPr/>
-        <p:nvPr/>
-      </p:nvGrpSpPr>
-      <p:grpSpPr>
-        <a:xfrm>
-          <a:off x="0" y="0"/>
-          <a:ext cx="0" cy="0"/>
-          <a:chOff x="0" y="0"/>
-          <a:chExt cx="0" cy="0"/>
-        </a:xfrm>
-      </p:grpSpPr>
-    </p:spTree>
-    <p:extLst>
-      <p:ext uri="{BB962C8B-B14F-4D97-AF65-F5344CB8AC3E}">
-        <p14:creationId xmlns:p14="http://schemas.microsoft.com/office/powerpoint/2010/main" val="1948486287"/>
-      </p:ext>
-    </p:extLst>
-  </p:cSld>
-  <p:clrMapOvr>
-    <a:masterClrMapping/>
-  </p:clrMapOvr>
-</p:sld>
-</file>
-
-<file path=ppt/slides/slide5.xml><?xml version="1.0" encoding="utf-8"?>
-<p:sld xmlns:a="http://schemas.openxmlformats.org/drawingml/2006/main" xmlns:r="http://schemas.openxmlformats.org/officeDocument/2006/relationships" xmlns:p="http://schemas.openxmlformats.org/presentationml/2006/main">
-  <p:cSld>
-    <p:bg>
-      <p:bgPr>
-        <a:blipFill dpi="0" rotWithShape="1">
-          <a:blip r:embed="rId2">
-            <a:lum/>
-          </a:blip>
-          <a:srcRect/>
-          <a:stretch>
             <a:fillRect l="-1000" r="-1000"/>
           </a:stretch>
         </a:blipFill>
@@ -3172,50 +3126,6 @@
     <p:extLst>
       <p:ext uri="{BB962C8B-B14F-4D97-AF65-F5344CB8AC3E}">
         <p14:creationId xmlns:p14="http://schemas.microsoft.com/office/powerpoint/2010/main" val="3329836637"/>
-      </p:ext>
-    </p:extLst>
-  </p:cSld>
-  <p:clrMapOvr>
-    <a:masterClrMapping/>
-  </p:clrMapOvr>
-</p:sld>
-</file>
-
-<file path=ppt/slides/slide6.xml><?xml version="1.0" encoding="utf-8"?>
-<p:sld xmlns:a="http://schemas.openxmlformats.org/drawingml/2006/main" xmlns:r="http://schemas.openxmlformats.org/officeDocument/2006/relationships" xmlns:p="http://schemas.openxmlformats.org/presentationml/2006/main">
-  <p:cSld>
-    <p:bg>
-      <p:bgPr>
-        <a:blipFill dpi="0" rotWithShape="1">
-          <a:blip r:embed="rId2">
-            <a:lum/>
-          </a:blip>
-          <a:srcRect/>
-          <a:stretch>
-            <a:fillRect t="-4000" b="-4000"/>
-          </a:stretch>
-        </a:blipFill>
-        <a:effectLst/>
-      </p:bgPr>
-    </p:bg>
-    <p:spTree>
-      <p:nvGrpSpPr>
-        <p:cNvPr id="1" name=""/>
-        <p:cNvGrpSpPr/>
-        <p:nvPr/>
-      </p:nvGrpSpPr>
-      <p:grpSpPr>
-        <a:xfrm>
-          <a:off x="0" y="0"/>
-          <a:ext cx="0" cy="0"/>
-          <a:chOff x="0" y="0"/>
-          <a:chExt cx="0" cy="0"/>
-        </a:xfrm>
-      </p:grpSpPr>
-    </p:spTree>
-    <p:extLst>
-      <p:ext uri="{BB962C8B-B14F-4D97-AF65-F5344CB8AC3E}">
-        <p14:creationId xmlns:p14="http://schemas.microsoft.com/office/powerpoint/2010/main" val="2117283731"/>
       </p:ext>
     </p:extLst>
   </p:cSld>

</xml_diff>

<commit_message>
optimized banner images optimized carousel images
</commit_message>
<xml_diff>
--- a/img/ppt/carousel-images.pptx
+++ b/img/ppt/carousel-images.pptx
@@ -2,7 +2,7 @@
 <file path=ppt/presentation.xml><?xml version="1.0" encoding="utf-8"?>
 <p:presentation xmlns:a="http://schemas.openxmlformats.org/drawingml/2006/main" xmlns:r="http://schemas.openxmlformats.org/officeDocument/2006/relationships" xmlns:p="http://schemas.openxmlformats.org/presentationml/2006/main" saveSubsetFonts="1">
   <p:sldMasterIdLst>
-    <p:sldMasterId id="2147483696" r:id="rId1"/>
+    <p:sldMasterId id="2147483708" r:id="rId1"/>
   </p:sldMasterIdLst>
   <p:sldIdLst>
     <p:sldId id="256" r:id="rId2"/>
@@ -10,14 +10,14 @@
     <p:sldId id="258" r:id="rId4"/>
     <p:sldId id="260" r:id="rId5"/>
   </p:sldIdLst>
-  <p:sldSz cx="9144000" cy="4572000"/>
+  <p:sldSz cx="10972800" cy="5486400"/>
   <p:notesSz cx="6858000" cy="9144000"/>
   <p:defaultTextStyle>
     <a:defPPr>
       <a:defRPr lang="en-US"/>
     </a:defPPr>
-    <a:lvl1pPr marL="0" algn="l" defTabSz="790035" rtl="0" eaLnBrk="1" latinLnBrk="0" hangingPunct="1">
-      <a:defRPr sz="1555" kern="1200">
+    <a:lvl1pPr marL="0" algn="l" defTabSz="948042" rtl="0" eaLnBrk="1" latinLnBrk="0" hangingPunct="1">
+      <a:defRPr sz="1866" kern="1200">
         <a:solidFill>
           <a:schemeClr val="tx1"/>
         </a:solidFill>
@@ -26,8 +26,8 @@
         <a:cs typeface="+mn-cs"/>
       </a:defRPr>
     </a:lvl1pPr>
-    <a:lvl2pPr marL="395015" algn="l" defTabSz="790035" rtl="0" eaLnBrk="1" latinLnBrk="0" hangingPunct="1">
-      <a:defRPr sz="1555" kern="1200">
+    <a:lvl2pPr marL="474018" algn="l" defTabSz="948042" rtl="0" eaLnBrk="1" latinLnBrk="0" hangingPunct="1">
+      <a:defRPr sz="1866" kern="1200">
         <a:solidFill>
           <a:schemeClr val="tx1"/>
         </a:solidFill>
@@ -36,8 +36,8 @@
         <a:cs typeface="+mn-cs"/>
       </a:defRPr>
     </a:lvl2pPr>
-    <a:lvl3pPr marL="790035" algn="l" defTabSz="790035" rtl="0" eaLnBrk="1" latinLnBrk="0" hangingPunct="1">
-      <a:defRPr sz="1555" kern="1200">
+    <a:lvl3pPr marL="948042" algn="l" defTabSz="948042" rtl="0" eaLnBrk="1" latinLnBrk="0" hangingPunct="1">
+      <a:defRPr sz="1866" kern="1200">
         <a:solidFill>
           <a:schemeClr val="tx1"/>
         </a:solidFill>
@@ -46,8 +46,8 @@
         <a:cs typeface="+mn-cs"/>
       </a:defRPr>
     </a:lvl3pPr>
-    <a:lvl4pPr marL="1185055" algn="l" defTabSz="790035" rtl="0" eaLnBrk="1" latinLnBrk="0" hangingPunct="1">
-      <a:defRPr sz="1555" kern="1200">
+    <a:lvl4pPr marL="1422066" algn="l" defTabSz="948042" rtl="0" eaLnBrk="1" latinLnBrk="0" hangingPunct="1">
+      <a:defRPr sz="1866" kern="1200">
         <a:solidFill>
           <a:schemeClr val="tx1"/>
         </a:solidFill>
@@ -56,8 +56,8 @@
         <a:cs typeface="+mn-cs"/>
       </a:defRPr>
     </a:lvl4pPr>
-    <a:lvl5pPr marL="1580075" algn="l" defTabSz="790035" rtl="0" eaLnBrk="1" latinLnBrk="0" hangingPunct="1">
-      <a:defRPr sz="1555" kern="1200">
+    <a:lvl5pPr marL="1896090" algn="l" defTabSz="948042" rtl="0" eaLnBrk="1" latinLnBrk="0" hangingPunct="1">
+      <a:defRPr sz="1866" kern="1200">
         <a:solidFill>
           <a:schemeClr val="tx1"/>
         </a:solidFill>
@@ -66,8 +66,8 @@
         <a:cs typeface="+mn-cs"/>
       </a:defRPr>
     </a:lvl5pPr>
-    <a:lvl6pPr marL="1975090" algn="l" defTabSz="790035" rtl="0" eaLnBrk="1" latinLnBrk="0" hangingPunct="1">
-      <a:defRPr sz="1555" kern="1200">
+    <a:lvl6pPr marL="2370108" algn="l" defTabSz="948042" rtl="0" eaLnBrk="1" latinLnBrk="0" hangingPunct="1">
+      <a:defRPr sz="1866" kern="1200">
         <a:solidFill>
           <a:schemeClr val="tx1"/>
         </a:solidFill>
@@ -76,8 +76,8 @@
         <a:cs typeface="+mn-cs"/>
       </a:defRPr>
     </a:lvl6pPr>
-    <a:lvl7pPr marL="2370110" algn="l" defTabSz="790035" rtl="0" eaLnBrk="1" latinLnBrk="0" hangingPunct="1">
-      <a:defRPr sz="1555" kern="1200">
+    <a:lvl7pPr marL="2844132" algn="l" defTabSz="948042" rtl="0" eaLnBrk="1" latinLnBrk="0" hangingPunct="1">
+      <a:defRPr sz="1866" kern="1200">
         <a:solidFill>
           <a:schemeClr val="tx1"/>
         </a:solidFill>
@@ -86,8 +86,8 @@
         <a:cs typeface="+mn-cs"/>
       </a:defRPr>
     </a:lvl7pPr>
-    <a:lvl8pPr marL="2765130" algn="l" defTabSz="790035" rtl="0" eaLnBrk="1" latinLnBrk="0" hangingPunct="1">
-      <a:defRPr sz="1555" kern="1200">
+    <a:lvl8pPr marL="3318156" algn="l" defTabSz="948042" rtl="0" eaLnBrk="1" latinLnBrk="0" hangingPunct="1">
+      <a:defRPr sz="1866" kern="1200">
         <a:solidFill>
           <a:schemeClr val="tx1"/>
         </a:solidFill>
@@ -96,8 +96,8 @@
         <a:cs typeface="+mn-cs"/>
       </a:defRPr>
     </a:lvl8pPr>
-    <a:lvl9pPr marL="3160145" algn="l" defTabSz="790035" rtl="0" eaLnBrk="1" latinLnBrk="0" hangingPunct="1">
-      <a:defRPr sz="1555" kern="1200">
+    <a:lvl9pPr marL="3792174" algn="l" defTabSz="948042" rtl="0" eaLnBrk="1" latinLnBrk="0" hangingPunct="1">
+      <a:defRPr sz="1866" kern="1200">
         <a:solidFill>
           <a:schemeClr val="tx1"/>
         </a:solidFill>
@@ -144,15 +144,15 @@
         </p:nvSpPr>
         <p:spPr>
           <a:xfrm>
-            <a:off x="1143000" y="748242"/>
-            <a:ext cx="6858000" cy="1591733"/>
+            <a:off x="1371600" y="897890"/>
+            <a:ext cx="8229600" cy="1910080"/>
           </a:xfrm>
         </p:spPr>
         <p:txBody>
           <a:bodyPr anchor="b"/>
           <a:lstStyle>
             <a:lvl1pPr algn="ctr">
-              <a:defRPr sz="4000"/>
+              <a:defRPr sz="4800"/>
             </a:lvl1pPr>
           </a:lstStyle>
           <a:p>
@@ -176,8 +176,8 @@
         </p:nvSpPr>
         <p:spPr>
           <a:xfrm>
-            <a:off x="1143000" y="2401359"/>
-            <a:ext cx="6858000" cy="1103841"/>
+            <a:off x="1371600" y="2881630"/>
+            <a:ext cx="8229600" cy="1324610"/>
           </a:xfrm>
         </p:spPr>
         <p:txBody>
@@ -185,39 +185,39 @@
           <a:lstStyle>
             <a:lvl1pPr marL="0" indent="0" algn="ctr">
               <a:buNone/>
+              <a:defRPr sz="1920"/>
+            </a:lvl1pPr>
+            <a:lvl2pPr marL="365760" indent="0" algn="ctr">
+              <a:buNone/>
               <a:defRPr sz="1600"/>
-            </a:lvl1pPr>
-            <a:lvl2pPr marL="304815" indent="0" algn="ctr">
-              <a:buNone/>
-              <a:defRPr sz="1333"/>
             </a:lvl2pPr>
-            <a:lvl3pPr marL="609630" indent="0" algn="ctr">
-              <a:buNone/>
-              <a:defRPr sz="1200"/>
+            <a:lvl3pPr marL="731520" indent="0" algn="ctr">
+              <a:buNone/>
+              <a:defRPr sz="1440"/>
             </a:lvl3pPr>
-            <a:lvl4pPr marL="914446" indent="0" algn="ctr">
-              <a:buNone/>
-              <a:defRPr sz="1067"/>
+            <a:lvl4pPr marL="1097280" indent="0" algn="ctr">
+              <a:buNone/>
+              <a:defRPr sz="1280"/>
             </a:lvl4pPr>
-            <a:lvl5pPr marL="1219261" indent="0" algn="ctr">
-              <a:buNone/>
-              <a:defRPr sz="1067"/>
+            <a:lvl5pPr marL="1463040" indent="0" algn="ctr">
+              <a:buNone/>
+              <a:defRPr sz="1280"/>
             </a:lvl5pPr>
-            <a:lvl6pPr marL="1524076" indent="0" algn="ctr">
-              <a:buNone/>
-              <a:defRPr sz="1067"/>
+            <a:lvl6pPr marL="1828800" indent="0" algn="ctr">
+              <a:buNone/>
+              <a:defRPr sz="1280"/>
             </a:lvl6pPr>
-            <a:lvl7pPr marL="1828891" indent="0" algn="ctr">
-              <a:buNone/>
-              <a:defRPr sz="1067"/>
+            <a:lvl7pPr marL="2194560" indent="0" algn="ctr">
+              <a:buNone/>
+              <a:defRPr sz="1280"/>
             </a:lvl7pPr>
-            <a:lvl8pPr marL="2133707" indent="0" algn="ctr">
-              <a:buNone/>
-              <a:defRPr sz="1067"/>
+            <a:lvl8pPr marL="2560320" indent="0" algn="ctr">
+              <a:buNone/>
+              <a:defRPr sz="1280"/>
             </a:lvl8pPr>
-            <a:lvl9pPr marL="2438522" indent="0" algn="ctr">
-              <a:buNone/>
-              <a:defRPr sz="1067"/>
+            <a:lvl9pPr marL="2926080" indent="0" algn="ctr">
+              <a:buNone/>
+              <a:defRPr sz="1280"/>
             </a:lvl9pPr>
           </a:lstStyle>
           <a:p>
@@ -246,7 +246,7 @@
           <a:p>
             <a:fld id="{7B30DEEB-4051-4B0C-A7AF-4DAE803EFFB5}" type="datetimeFigureOut">
               <a:rPr lang="en-US" smtClean="0"/>
-              <a:t>11/19/2017</a:t>
+              <a:t>1/13/2018</a:t>
             </a:fld>
             <a:endParaRPr lang="en-US"/>
           </a:p>
@@ -297,7 +297,7 @@
     </p:spTree>
     <p:extLst>
       <p:ext uri="{BB962C8B-B14F-4D97-AF65-F5344CB8AC3E}">
-        <p14:creationId xmlns:p14="http://schemas.microsoft.com/office/powerpoint/2010/main" val="935133186"/>
+        <p14:creationId xmlns:p14="http://schemas.microsoft.com/office/powerpoint/2010/main" val="1405484202"/>
       </p:ext>
     </p:extLst>
   </p:cSld>
@@ -416,7 +416,7 @@
           <a:p>
             <a:fld id="{7B30DEEB-4051-4B0C-A7AF-4DAE803EFFB5}" type="datetimeFigureOut">
               <a:rPr lang="en-US" smtClean="0"/>
-              <a:t>11/19/2017</a:t>
+              <a:t>1/13/2018</a:t>
             </a:fld>
             <a:endParaRPr lang="en-US"/>
           </a:p>
@@ -467,7 +467,7 @@
     </p:spTree>
     <p:extLst>
       <p:ext uri="{BB962C8B-B14F-4D97-AF65-F5344CB8AC3E}">
-        <p14:creationId xmlns:p14="http://schemas.microsoft.com/office/powerpoint/2010/main" val="3247676688"/>
+        <p14:creationId xmlns:p14="http://schemas.microsoft.com/office/powerpoint/2010/main" val="4230590197"/>
       </p:ext>
     </p:extLst>
   </p:cSld>
@@ -506,8 +506,8 @@
         </p:nvSpPr>
         <p:spPr>
           <a:xfrm>
-            <a:off x="6543675" y="243417"/>
-            <a:ext cx="1971675" cy="3874559"/>
+            <a:off x="7852410" y="292100"/>
+            <a:ext cx="2366010" cy="4649470"/>
           </a:xfrm>
         </p:spPr>
         <p:txBody>
@@ -534,8 +534,8 @@
         </p:nvSpPr>
         <p:spPr>
           <a:xfrm>
-            <a:off x="628650" y="243417"/>
-            <a:ext cx="5800725" cy="3874559"/>
+            <a:off x="754380" y="292100"/>
+            <a:ext cx="6960870" cy="4649470"/>
           </a:xfrm>
         </p:spPr>
         <p:txBody>
@@ -596,7 +596,7 @@
           <a:p>
             <a:fld id="{7B30DEEB-4051-4B0C-A7AF-4DAE803EFFB5}" type="datetimeFigureOut">
               <a:rPr lang="en-US" smtClean="0"/>
-              <a:t>11/19/2017</a:t>
+              <a:t>1/13/2018</a:t>
             </a:fld>
             <a:endParaRPr lang="en-US"/>
           </a:p>
@@ -647,7 +647,7 @@
     </p:spTree>
     <p:extLst>
       <p:ext uri="{BB962C8B-B14F-4D97-AF65-F5344CB8AC3E}">
-        <p14:creationId xmlns:p14="http://schemas.microsoft.com/office/powerpoint/2010/main" val="1431155950"/>
+        <p14:creationId xmlns:p14="http://schemas.microsoft.com/office/powerpoint/2010/main" val="1963812750"/>
       </p:ext>
     </p:extLst>
   </p:cSld>
@@ -766,7 +766,7 @@
           <a:p>
             <a:fld id="{7B30DEEB-4051-4B0C-A7AF-4DAE803EFFB5}" type="datetimeFigureOut">
               <a:rPr lang="en-US" smtClean="0"/>
-              <a:t>11/19/2017</a:t>
+              <a:t>1/13/2018</a:t>
             </a:fld>
             <a:endParaRPr lang="en-US"/>
           </a:p>
@@ -817,7 +817,7 @@
     </p:spTree>
     <p:extLst>
       <p:ext uri="{BB962C8B-B14F-4D97-AF65-F5344CB8AC3E}">
-        <p14:creationId xmlns:p14="http://schemas.microsoft.com/office/powerpoint/2010/main" val="1550170325"/>
+        <p14:creationId xmlns:p14="http://schemas.microsoft.com/office/powerpoint/2010/main" val="3495838228"/>
       </p:ext>
     </p:extLst>
   </p:cSld>
@@ -856,15 +856,15 @@
         </p:nvSpPr>
         <p:spPr>
           <a:xfrm>
-            <a:off x="623888" y="1139826"/>
-            <a:ext cx="7886700" cy="1901825"/>
+            <a:off x="748665" y="1367791"/>
+            <a:ext cx="9464040" cy="2282190"/>
           </a:xfrm>
         </p:spPr>
         <p:txBody>
           <a:bodyPr anchor="b"/>
           <a:lstStyle>
             <a:lvl1pPr>
-              <a:defRPr sz="4000"/>
+              <a:defRPr sz="4800"/>
             </a:lvl1pPr>
           </a:lstStyle>
           <a:p>
@@ -888,14 +888,24 @@
         </p:nvSpPr>
         <p:spPr>
           <a:xfrm>
-            <a:off x="623888" y="3059642"/>
-            <a:ext cx="7886700" cy="1000125"/>
+            <a:off x="748665" y="3671571"/>
+            <a:ext cx="9464040" cy="1200150"/>
           </a:xfrm>
         </p:spPr>
         <p:txBody>
           <a:bodyPr/>
           <a:lstStyle>
             <a:lvl1pPr marL="0" indent="0">
+              <a:buNone/>
+              <a:defRPr sz="1920">
+                <a:solidFill>
+                  <a:schemeClr val="tx1">
+                    <a:tint val="75000"/>
+                  </a:schemeClr>
+                </a:solidFill>
+              </a:defRPr>
+            </a:lvl1pPr>
+            <a:lvl2pPr marL="365760" indent="0">
               <a:buNone/>
               <a:defRPr sz="1600">
                 <a:solidFill>
@@ -904,20 +914,10 @@
                   </a:schemeClr>
                 </a:solidFill>
               </a:defRPr>
-            </a:lvl1pPr>
-            <a:lvl2pPr marL="304815" indent="0">
-              <a:buNone/>
-              <a:defRPr sz="1333">
-                <a:solidFill>
-                  <a:schemeClr val="tx1">
-                    <a:tint val="75000"/>
-                  </a:schemeClr>
-                </a:solidFill>
-              </a:defRPr>
             </a:lvl2pPr>
-            <a:lvl3pPr marL="609630" indent="0">
-              <a:buNone/>
-              <a:defRPr sz="1200">
+            <a:lvl3pPr marL="731520" indent="0">
+              <a:buNone/>
+              <a:defRPr sz="1440">
                 <a:solidFill>
                   <a:schemeClr val="tx1">
                     <a:tint val="75000"/>
@@ -925,9 +925,9 @@
                 </a:solidFill>
               </a:defRPr>
             </a:lvl3pPr>
-            <a:lvl4pPr marL="914446" indent="0">
-              <a:buNone/>
-              <a:defRPr sz="1067">
+            <a:lvl4pPr marL="1097280" indent="0">
+              <a:buNone/>
+              <a:defRPr sz="1280">
                 <a:solidFill>
                   <a:schemeClr val="tx1">
                     <a:tint val="75000"/>
@@ -935,9 +935,9 @@
                 </a:solidFill>
               </a:defRPr>
             </a:lvl4pPr>
-            <a:lvl5pPr marL="1219261" indent="0">
-              <a:buNone/>
-              <a:defRPr sz="1067">
+            <a:lvl5pPr marL="1463040" indent="0">
+              <a:buNone/>
+              <a:defRPr sz="1280">
                 <a:solidFill>
                   <a:schemeClr val="tx1">
                     <a:tint val="75000"/>
@@ -945,9 +945,9 @@
                 </a:solidFill>
               </a:defRPr>
             </a:lvl5pPr>
-            <a:lvl6pPr marL="1524076" indent="0">
-              <a:buNone/>
-              <a:defRPr sz="1067">
+            <a:lvl6pPr marL="1828800" indent="0">
+              <a:buNone/>
+              <a:defRPr sz="1280">
                 <a:solidFill>
                   <a:schemeClr val="tx1">
                     <a:tint val="75000"/>
@@ -955,9 +955,9 @@
                 </a:solidFill>
               </a:defRPr>
             </a:lvl6pPr>
-            <a:lvl7pPr marL="1828891" indent="0">
-              <a:buNone/>
-              <a:defRPr sz="1067">
+            <a:lvl7pPr marL="2194560" indent="0">
+              <a:buNone/>
+              <a:defRPr sz="1280">
                 <a:solidFill>
                   <a:schemeClr val="tx1">
                     <a:tint val="75000"/>
@@ -965,9 +965,9 @@
                 </a:solidFill>
               </a:defRPr>
             </a:lvl7pPr>
-            <a:lvl8pPr marL="2133707" indent="0">
-              <a:buNone/>
-              <a:defRPr sz="1067">
+            <a:lvl8pPr marL="2560320" indent="0">
+              <a:buNone/>
+              <a:defRPr sz="1280">
                 <a:solidFill>
                   <a:schemeClr val="tx1">
                     <a:tint val="75000"/>
@@ -975,9 +975,9 @@
                 </a:solidFill>
               </a:defRPr>
             </a:lvl8pPr>
-            <a:lvl9pPr marL="2438522" indent="0">
-              <a:buNone/>
-              <a:defRPr sz="1067">
+            <a:lvl9pPr marL="2926080" indent="0">
+              <a:buNone/>
+              <a:defRPr sz="1280">
                 <a:solidFill>
                   <a:schemeClr val="tx1">
                     <a:tint val="75000"/>
@@ -1012,7 +1012,7 @@
           <a:p>
             <a:fld id="{7B30DEEB-4051-4B0C-A7AF-4DAE803EFFB5}" type="datetimeFigureOut">
               <a:rPr lang="en-US" smtClean="0"/>
-              <a:t>11/19/2017</a:t>
+              <a:t>1/13/2018</a:t>
             </a:fld>
             <a:endParaRPr lang="en-US"/>
           </a:p>
@@ -1063,7 +1063,7 @@
     </p:spTree>
     <p:extLst>
       <p:ext uri="{BB962C8B-B14F-4D97-AF65-F5344CB8AC3E}">
-        <p14:creationId xmlns:p14="http://schemas.microsoft.com/office/powerpoint/2010/main" val="1734095952"/>
+        <p14:creationId xmlns:p14="http://schemas.microsoft.com/office/powerpoint/2010/main" val="1373530244"/>
       </p:ext>
     </p:extLst>
   </p:cSld>
@@ -1125,8 +1125,8 @@
         </p:nvSpPr>
         <p:spPr>
           <a:xfrm>
-            <a:off x="628650" y="1217083"/>
-            <a:ext cx="3886200" cy="2900892"/>
+            <a:off x="754380" y="1460500"/>
+            <a:ext cx="4663440" cy="3481070"/>
           </a:xfrm>
         </p:spPr>
         <p:txBody>
@@ -1182,8 +1182,8 @@
         </p:nvSpPr>
         <p:spPr>
           <a:xfrm>
-            <a:off x="4629150" y="1217083"/>
-            <a:ext cx="3886200" cy="2900892"/>
+            <a:off x="5554980" y="1460500"/>
+            <a:ext cx="4663440" cy="3481070"/>
           </a:xfrm>
         </p:spPr>
         <p:txBody>
@@ -1244,7 +1244,7 @@
           <a:p>
             <a:fld id="{7B30DEEB-4051-4B0C-A7AF-4DAE803EFFB5}" type="datetimeFigureOut">
               <a:rPr lang="en-US" smtClean="0"/>
-              <a:t>11/19/2017</a:t>
+              <a:t>1/13/2018</a:t>
             </a:fld>
             <a:endParaRPr lang="en-US"/>
           </a:p>
@@ -1295,7 +1295,7 @@
     </p:spTree>
     <p:extLst>
       <p:ext uri="{BB962C8B-B14F-4D97-AF65-F5344CB8AC3E}">
-        <p14:creationId xmlns:p14="http://schemas.microsoft.com/office/powerpoint/2010/main" val="2645946986"/>
+        <p14:creationId xmlns:p14="http://schemas.microsoft.com/office/powerpoint/2010/main" val="3409194612"/>
       </p:ext>
     </p:extLst>
   </p:cSld>
@@ -1334,8 +1334,8 @@
         </p:nvSpPr>
         <p:spPr>
           <a:xfrm>
-            <a:off x="629841" y="243417"/>
-            <a:ext cx="7886700" cy="883709"/>
+            <a:off x="755809" y="292101"/>
+            <a:ext cx="9464040" cy="1060450"/>
           </a:xfrm>
         </p:spPr>
         <p:txBody>
@@ -1362,8 +1362,8 @@
         </p:nvSpPr>
         <p:spPr>
           <a:xfrm>
-            <a:off x="629842" y="1120775"/>
-            <a:ext cx="3868340" cy="549275"/>
+            <a:off x="755810" y="1344930"/>
+            <a:ext cx="4642008" cy="659130"/>
           </a:xfrm>
         </p:spPr>
         <p:txBody>
@@ -1371,39 +1371,39 @@
           <a:lstStyle>
             <a:lvl1pPr marL="0" indent="0">
               <a:buNone/>
+              <a:defRPr sz="1920" b="1"/>
+            </a:lvl1pPr>
+            <a:lvl2pPr marL="365760" indent="0">
+              <a:buNone/>
               <a:defRPr sz="1600" b="1"/>
-            </a:lvl1pPr>
-            <a:lvl2pPr marL="304815" indent="0">
-              <a:buNone/>
-              <a:defRPr sz="1333" b="1"/>
             </a:lvl2pPr>
-            <a:lvl3pPr marL="609630" indent="0">
-              <a:buNone/>
-              <a:defRPr sz="1200" b="1"/>
+            <a:lvl3pPr marL="731520" indent="0">
+              <a:buNone/>
+              <a:defRPr sz="1440" b="1"/>
             </a:lvl3pPr>
-            <a:lvl4pPr marL="914446" indent="0">
-              <a:buNone/>
-              <a:defRPr sz="1067" b="1"/>
+            <a:lvl4pPr marL="1097280" indent="0">
+              <a:buNone/>
+              <a:defRPr sz="1280" b="1"/>
             </a:lvl4pPr>
-            <a:lvl5pPr marL="1219261" indent="0">
-              <a:buNone/>
-              <a:defRPr sz="1067" b="1"/>
+            <a:lvl5pPr marL="1463040" indent="0">
+              <a:buNone/>
+              <a:defRPr sz="1280" b="1"/>
             </a:lvl5pPr>
-            <a:lvl6pPr marL="1524076" indent="0">
-              <a:buNone/>
-              <a:defRPr sz="1067" b="1"/>
+            <a:lvl6pPr marL="1828800" indent="0">
+              <a:buNone/>
+              <a:defRPr sz="1280" b="1"/>
             </a:lvl6pPr>
-            <a:lvl7pPr marL="1828891" indent="0">
-              <a:buNone/>
-              <a:defRPr sz="1067" b="1"/>
+            <a:lvl7pPr marL="2194560" indent="0">
+              <a:buNone/>
+              <a:defRPr sz="1280" b="1"/>
             </a:lvl7pPr>
-            <a:lvl8pPr marL="2133707" indent="0">
-              <a:buNone/>
-              <a:defRPr sz="1067" b="1"/>
+            <a:lvl8pPr marL="2560320" indent="0">
+              <a:buNone/>
+              <a:defRPr sz="1280" b="1"/>
             </a:lvl8pPr>
-            <a:lvl9pPr marL="2438522" indent="0">
-              <a:buNone/>
-              <a:defRPr sz="1067" b="1"/>
+            <a:lvl9pPr marL="2926080" indent="0">
+              <a:buNone/>
+              <a:defRPr sz="1280" b="1"/>
             </a:lvl9pPr>
           </a:lstStyle>
           <a:p>
@@ -1427,8 +1427,8 @@
         </p:nvSpPr>
         <p:spPr>
           <a:xfrm>
-            <a:off x="629842" y="1670050"/>
-            <a:ext cx="3868340" cy="2456392"/>
+            <a:off x="755810" y="2004060"/>
+            <a:ext cx="4642008" cy="2947670"/>
           </a:xfrm>
         </p:spPr>
         <p:txBody>
@@ -1484,8 +1484,8 @@
         </p:nvSpPr>
         <p:spPr>
           <a:xfrm>
-            <a:off x="4629150" y="1120775"/>
-            <a:ext cx="3887391" cy="549275"/>
+            <a:off x="5554980" y="1344930"/>
+            <a:ext cx="4664869" cy="659130"/>
           </a:xfrm>
         </p:spPr>
         <p:txBody>
@@ -1493,39 +1493,39 @@
           <a:lstStyle>
             <a:lvl1pPr marL="0" indent="0">
               <a:buNone/>
+              <a:defRPr sz="1920" b="1"/>
+            </a:lvl1pPr>
+            <a:lvl2pPr marL="365760" indent="0">
+              <a:buNone/>
               <a:defRPr sz="1600" b="1"/>
-            </a:lvl1pPr>
-            <a:lvl2pPr marL="304815" indent="0">
-              <a:buNone/>
-              <a:defRPr sz="1333" b="1"/>
             </a:lvl2pPr>
-            <a:lvl3pPr marL="609630" indent="0">
-              <a:buNone/>
-              <a:defRPr sz="1200" b="1"/>
+            <a:lvl3pPr marL="731520" indent="0">
+              <a:buNone/>
+              <a:defRPr sz="1440" b="1"/>
             </a:lvl3pPr>
-            <a:lvl4pPr marL="914446" indent="0">
-              <a:buNone/>
-              <a:defRPr sz="1067" b="1"/>
+            <a:lvl4pPr marL="1097280" indent="0">
+              <a:buNone/>
+              <a:defRPr sz="1280" b="1"/>
             </a:lvl4pPr>
-            <a:lvl5pPr marL="1219261" indent="0">
-              <a:buNone/>
-              <a:defRPr sz="1067" b="1"/>
+            <a:lvl5pPr marL="1463040" indent="0">
+              <a:buNone/>
+              <a:defRPr sz="1280" b="1"/>
             </a:lvl5pPr>
-            <a:lvl6pPr marL="1524076" indent="0">
-              <a:buNone/>
-              <a:defRPr sz="1067" b="1"/>
+            <a:lvl6pPr marL="1828800" indent="0">
+              <a:buNone/>
+              <a:defRPr sz="1280" b="1"/>
             </a:lvl6pPr>
-            <a:lvl7pPr marL="1828891" indent="0">
-              <a:buNone/>
-              <a:defRPr sz="1067" b="1"/>
+            <a:lvl7pPr marL="2194560" indent="0">
+              <a:buNone/>
+              <a:defRPr sz="1280" b="1"/>
             </a:lvl7pPr>
-            <a:lvl8pPr marL="2133707" indent="0">
-              <a:buNone/>
-              <a:defRPr sz="1067" b="1"/>
+            <a:lvl8pPr marL="2560320" indent="0">
+              <a:buNone/>
+              <a:defRPr sz="1280" b="1"/>
             </a:lvl8pPr>
-            <a:lvl9pPr marL="2438522" indent="0">
-              <a:buNone/>
-              <a:defRPr sz="1067" b="1"/>
+            <a:lvl9pPr marL="2926080" indent="0">
+              <a:buNone/>
+              <a:defRPr sz="1280" b="1"/>
             </a:lvl9pPr>
           </a:lstStyle>
           <a:p>
@@ -1549,8 +1549,8 @@
         </p:nvSpPr>
         <p:spPr>
           <a:xfrm>
-            <a:off x="4629150" y="1670050"/>
-            <a:ext cx="3887391" cy="2456392"/>
+            <a:off x="5554980" y="2004060"/>
+            <a:ext cx="4664869" cy="2947670"/>
           </a:xfrm>
         </p:spPr>
         <p:txBody>
@@ -1611,7 +1611,7 @@
           <a:p>
             <a:fld id="{7B30DEEB-4051-4B0C-A7AF-4DAE803EFFB5}" type="datetimeFigureOut">
               <a:rPr lang="en-US" smtClean="0"/>
-              <a:t>11/19/2017</a:t>
+              <a:t>1/13/2018</a:t>
             </a:fld>
             <a:endParaRPr lang="en-US"/>
           </a:p>
@@ -1662,7 +1662,7 @@
     </p:spTree>
     <p:extLst>
       <p:ext uri="{BB962C8B-B14F-4D97-AF65-F5344CB8AC3E}">
-        <p14:creationId xmlns:p14="http://schemas.microsoft.com/office/powerpoint/2010/main" val="3691395567"/>
+        <p14:creationId xmlns:p14="http://schemas.microsoft.com/office/powerpoint/2010/main" val="197962376"/>
       </p:ext>
     </p:extLst>
   </p:cSld>
@@ -1729,7 +1729,7 @@
           <a:p>
             <a:fld id="{7B30DEEB-4051-4B0C-A7AF-4DAE803EFFB5}" type="datetimeFigureOut">
               <a:rPr lang="en-US" smtClean="0"/>
-              <a:t>11/19/2017</a:t>
+              <a:t>1/13/2018</a:t>
             </a:fld>
             <a:endParaRPr lang="en-US"/>
           </a:p>
@@ -1780,7 +1780,7 @@
     </p:spTree>
     <p:extLst>
       <p:ext uri="{BB962C8B-B14F-4D97-AF65-F5344CB8AC3E}">
-        <p14:creationId xmlns:p14="http://schemas.microsoft.com/office/powerpoint/2010/main" val="3401278189"/>
+        <p14:creationId xmlns:p14="http://schemas.microsoft.com/office/powerpoint/2010/main" val="2601931808"/>
       </p:ext>
     </p:extLst>
   </p:cSld>
@@ -1824,7 +1824,7 @@
           <a:p>
             <a:fld id="{7B30DEEB-4051-4B0C-A7AF-4DAE803EFFB5}" type="datetimeFigureOut">
               <a:rPr lang="en-US" smtClean="0"/>
-              <a:t>11/19/2017</a:t>
+              <a:t>1/13/2018</a:t>
             </a:fld>
             <a:endParaRPr lang="en-US"/>
           </a:p>
@@ -1875,7 +1875,7 @@
     </p:spTree>
     <p:extLst>
       <p:ext uri="{BB962C8B-B14F-4D97-AF65-F5344CB8AC3E}">
-        <p14:creationId xmlns:p14="http://schemas.microsoft.com/office/powerpoint/2010/main" val="2692568493"/>
+        <p14:creationId xmlns:p14="http://schemas.microsoft.com/office/powerpoint/2010/main" val="3675571032"/>
       </p:ext>
     </p:extLst>
   </p:cSld>
@@ -1914,15 +1914,15 @@
         </p:nvSpPr>
         <p:spPr>
           <a:xfrm>
-            <a:off x="629841" y="304800"/>
-            <a:ext cx="2949178" cy="1066800"/>
+            <a:off x="755810" y="365760"/>
+            <a:ext cx="3539013" cy="1280160"/>
           </a:xfrm>
         </p:spPr>
         <p:txBody>
           <a:bodyPr anchor="b"/>
           <a:lstStyle>
             <a:lvl1pPr>
-              <a:defRPr sz="2133"/>
+              <a:defRPr sz="2560"/>
             </a:lvl1pPr>
           </a:lstStyle>
           <a:p>
@@ -1946,39 +1946,39 @@
         </p:nvSpPr>
         <p:spPr>
           <a:xfrm>
-            <a:off x="3887391" y="658284"/>
-            <a:ext cx="4629150" cy="3249083"/>
+            <a:off x="4664869" y="789940"/>
+            <a:ext cx="5554980" cy="3898900"/>
           </a:xfrm>
         </p:spPr>
         <p:txBody>
           <a:bodyPr/>
           <a:lstStyle>
             <a:lvl1pPr>
-              <a:defRPr sz="2133"/>
+              <a:defRPr sz="2560"/>
             </a:lvl1pPr>
             <a:lvl2pPr>
-              <a:defRPr sz="1867"/>
+              <a:defRPr sz="2240"/>
             </a:lvl2pPr>
             <a:lvl3pPr>
-              <a:defRPr sz="1600"/>
+              <a:defRPr sz="1920"/>
             </a:lvl3pPr>
             <a:lvl4pPr>
-              <a:defRPr sz="1333"/>
+              <a:defRPr sz="1600"/>
             </a:lvl4pPr>
             <a:lvl5pPr>
-              <a:defRPr sz="1333"/>
+              <a:defRPr sz="1600"/>
             </a:lvl5pPr>
             <a:lvl6pPr>
-              <a:defRPr sz="1333"/>
+              <a:defRPr sz="1600"/>
             </a:lvl6pPr>
             <a:lvl7pPr>
-              <a:defRPr sz="1333"/>
+              <a:defRPr sz="1600"/>
             </a:lvl7pPr>
             <a:lvl8pPr>
-              <a:defRPr sz="1333"/>
+              <a:defRPr sz="1600"/>
             </a:lvl8pPr>
             <a:lvl9pPr>
-              <a:defRPr sz="1333"/>
+              <a:defRPr sz="1600"/>
             </a:lvl9pPr>
           </a:lstStyle>
           <a:p>
@@ -2031,8 +2031,8 @@
         </p:nvSpPr>
         <p:spPr>
           <a:xfrm>
-            <a:off x="629841" y="1371600"/>
-            <a:ext cx="2949178" cy="2541059"/>
+            <a:off x="755810" y="1645920"/>
+            <a:ext cx="3539013" cy="3049270"/>
           </a:xfrm>
         </p:spPr>
         <p:txBody>
@@ -2040,39 +2040,39 @@
           <a:lstStyle>
             <a:lvl1pPr marL="0" indent="0">
               <a:buNone/>
-              <a:defRPr sz="1067"/>
+              <a:defRPr sz="1280"/>
             </a:lvl1pPr>
-            <a:lvl2pPr marL="304815" indent="0">
-              <a:buNone/>
-              <a:defRPr sz="933"/>
+            <a:lvl2pPr marL="365760" indent="0">
+              <a:buNone/>
+              <a:defRPr sz="1120"/>
             </a:lvl2pPr>
-            <a:lvl3pPr marL="609630" indent="0">
+            <a:lvl3pPr marL="731520" indent="0">
+              <a:buNone/>
+              <a:defRPr sz="960"/>
+            </a:lvl3pPr>
+            <a:lvl4pPr marL="1097280" indent="0">
               <a:buNone/>
               <a:defRPr sz="800"/>
-            </a:lvl3pPr>
-            <a:lvl4pPr marL="914446" indent="0">
-              <a:buNone/>
-              <a:defRPr sz="667"/>
             </a:lvl4pPr>
-            <a:lvl5pPr marL="1219261" indent="0">
-              <a:buNone/>
-              <a:defRPr sz="667"/>
+            <a:lvl5pPr marL="1463040" indent="0">
+              <a:buNone/>
+              <a:defRPr sz="800"/>
             </a:lvl5pPr>
-            <a:lvl6pPr marL="1524076" indent="0">
-              <a:buNone/>
-              <a:defRPr sz="667"/>
+            <a:lvl6pPr marL="1828800" indent="0">
+              <a:buNone/>
+              <a:defRPr sz="800"/>
             </a:lvl6pPr>
-            <a:lvl7pPr marL="1828891" indent="0">
-              <a:buNone/>
-              <a:defRPr sz="667"/>
+            <a:lvl7pPr marL="2194560" indent="0">
+              <a:buNone/>
+              <a:defRPr sz="800"/>
             </a:lvl7pPr>
-            <a:lvl8pPr marL="2133707" indent="0">
-              <a:buNone/>
-              <a:defRPr sz="667"/>
+            <a:lvl8pPr marL="2560320" indent="0">
+              <a:buNone/>
+              <a:defRPr sz="800"/>
             </a:lvl8pPr>
-            <a:lvl9pPr marL="2438522" indent="0">
-              <a:buNone/>
-              <a:defRPr sz="667"/>
+            <a:lvl9pPr marL="2926080" indent="0">
+              <a:buNone/>
+              <a:defRPr sz="800"/>
             </a:lvl9pPr>
           </a:lstStyle>
           <a:p>
@@ -2101,7 +2101,7 @@
           <a:p>
             <a:fld id="{7B30DEEB-4051-4B0C-A7AF-4DAE803EFFB5}" type="datetimeFigureOut">
               <a:rPr lang="en-US" smtClean="0"/>
-              <a:t>11/19/2017</a:t>
+              <a:t>1/13/2018</a:t>
             </a:fld>
             <a:endParaRPr lang="en-US"/>
           </a:p>
@@ -2152,7 +2152,7 @@
     </p:spTree>
     <p:extLst>
       <p:ext uri="{BB962C8B-B14F-4D97-AF65-F5344CB8AC3E}">
-        <p14:creationId xmlns:p14="http://schemas.microsoft.com/office/powerpoint/2010/main" val="828423615"/>
+        <p14:creationId xmlns:p14="http://schemas.microsoft.com/office/powerpoint/2010/main" val="1686416983"/>
       </p:ext>
     </p:extLst>
   </p:cSld>
@@ -2191,15 +2191,15 @@
         </p:nvSpPr>
         <p:spPr>
           <a:xfrm>
-            <a:off x="629841" y="304800"/>
-            <a:ext cx="2949178" cy="1066800"/>
+            <a:off x="755810" y="365760"/>
+            <a:ext cx="3539013" cy="1280160"/>
           </a:xfrm>
         </p:spPr>
         <p:txBody>
           <a:bodyPr anchor="b"/>
           <a:lstStyle>
             <a:lvl1pPr>
-              <a:defRPr sz="2133"/>
+              <a:defRPr sz="2560"/>
             </a:lvl1pPr>
           </a:lstStyle>
           <a:p>
@@ -2223,8 +2223,8 @@
         </p:nvSpPr>
         <p:spPr>
           <a:xfrm>
-            <a:off x="3887391" y="658284"/>
-            <a:ext cx="4629150" cy="3249083"/>
+            <a:off x="4664869" y="789940"/>
+            <a:ext cx="5554980" cy="3898900"/>
           </a:xfrm>
         </p:spPr>
         <p:txBody>
@@ -2232,39 +2232,39 @@
           <a:lstStyle>
             <a:lvl1pPr marL="0" indent="0">
               <a:buNone/>
-              <a:defRPr sz="2133"/>
+              <a:defRPr sz="2560"/>
             </a:lvl1pPr>
-            <a:lvl2pPr marL="304815" indent="0">
-              <a:buNone/>
-              <a:defRPr sz="1867"/>
+            <a:lvl2pPr marL="365760" indent="0">
+              <a:buNone/>
+              <a:defRPr sz="2240"/>
             </a:lvl2pPr>
-            <a:lvl3pPr marL="609630" indent="0">
+            <a:lvl3pPr marL="731520" indent="0">
+              <a:buNone/>
+              <a:defRPr sz="1920"/>
+            </a:lvl3pPr>
+            <a:lvl4pPr marL="1097280" indent="0">
               <a:buNone/>
               <a:defRPr sz="1600"/>
-            </a:lvl3pPr>
-            <a:lvl4pPr marL="914446" indent="0">
-              <a:buNone/>
-              <a:defRPr sz="1333"/>
             </a:lvl4pPr>
-            <a:lvl5pPr marL="1219261" indent="0">
-              <a:buNone/>
-              <a:defRPr sz="1333"/>
+            <a:lvl5pPr marL="1463040" indent="0">
+              <a:buNone/>
+              <a:defRPr sz="1600"/>
             </a:lvl5pPr>
-            <a:lvl6pPr marL="1524076" indent="0">
-              <a:buNone/>
-              <a:defRPr sz="1333"/>
+            <a:lvl6pPr marL="1828800" indent="0">
+              <a:buNone/>
+              <a:defRPr sz="1600"/>
             </a:lvl6pPr>
-            <a:lvl7pPr marL="1828891" indent="0">
-              <a:buNone/>
-              <a:defRPr sz="1333"/>
+            <a:lvl7pPr marL="2194560" indent="0">
+              <a:buNone/>
+              <a:defRPr sz="1600"/>
             </a:lvl7pPr>
-            <a:lvl8pPr marL="2133707" indent="0">
-              <a:buNone/>
-              <a:defRPr sz="1333"/>
+            <a:lvl8pPr marL="2560320" indent="0">
+              <a:buNone/>
+              <a:defRPr sz="1600"/>
             </a:lvl8pPr>
-            <a:lvl9pPr marL="2438522" indent="0">
-              <a:buNone/>
-              <a:defRPr sz="1333"/>
+            <a:lvl9pPr marL="2926080" indent="0">
+              <a:buNone/>
+              <a:defRPr sz="1600"/>
             </a:lvl9pPr>
           </a:lstStyle>
           <a:p>
@@ -2288,8 +2288,8 @@
         </p:nvSpPr>
         <p:spPr>
           <a:xfrm>
-            <a:off x="629841" y="1371600"/>
-            <a:ext cx="2949178" cy="2541059"/>
+            <a:off x="755810" y="1645920"/>
+            <a:ext cx="3539013" cy="3049270"/>
           </a:xfrm>
         </p:spPr>
         <p:txBody>
@@ -2297,39 +2297,39 @@
           <a:lstStyle>
             <a:lvl1pPr marL="0" indent="0">
               <a:buNone/>
-              <a:defRPr sz="1067"/>
+              <a:defRPr sz="1280"/>
             </a:lvl1pPr>
-            <a:lvl2pPr marL="304815" indent="0">
-              <a:buNone/>
-              <a:defRPr sz="933"/>
+            <a:lvl2pPr marL="365760" indent="0">
+              <a:buNone/>
+              <a:defRPr sz="1120"/>
             </a:lvl2pPr>
-            <a:lvl3pPr marL="609630" indent="0">
+            <a:lvl3pPr marL="731520" indent="0">
+              <a:buNone/>
+              <a:defRPr sz="960"/>
+            </a:lvl3pPr>
+            <a:lvl4pPr marL="1097280" indent="0">
               <a:buNone/>
               <a:defRPr sz="800"/>
-            </a:lvl3pPr>
-            <a:lvl4pPr marL="914446" indent="0">
-              <a:buNone/>
-              <a:defRPr sz="667"/>
             </a:lvl4pPr>
-            <a:lvl5pPr marL="1219261" indent="0">
-              <a:buNone/>
-              <a:defRPr sz="667"/>
+            <a:lvl5pPr marL="1463040" indent="0">
+              <a:buNone/>
+              <a:defRPr sz="800"/>
             </a:lvl5pPr>
-            <a:lvl6pPr marL="1524076" indent="0">
-              <a:buNone/>
-              <a:defRPr sz="667"/>
+            <a:lvl6pPr marL="1828800" indent="0">
+              <a:buNone/>
+              <a:defRPr sz="800"/>
             </a:lvl6pPr>
-            <a:lvl7pPr marL="1828891" indent="0">
-              <a:buNone/>
-              <a:defRPr sz="667"/>
+            <a:lvl7pPr marL="2194560" indent="0">
+              <a:buNone/>
+              <a:defRPr sz="800"/>
             </a:lvl7pPr>
-            <a:lvl8pPr marL="2133707" indent="0">
-              <a:buNone/>
-              <a:defRPr sz="667"/>
+            <a:lvl8pPr marL="2560320" indent="0">
+              <a:buNone/>
+              <a:defRPr sz="800"/>
             </a:lvl8pPr>
-            <a:lvl9pPr marL="2438522" indent="0">
-              <a:buNone/>
-              <a:defRPr sz="667"/>
+            <a:lvl9pPr marL="2926080" indent="0">
+              <a:buNone/>
+              <a:defRPr sz="800"/>
             </a:lvl9pPr>
           </a:lstStyle>
           <a:p>
@@ -2358,7 +2358,7 @@
           <a:p>
             <a:fld id="{7B30DEEB-4051-4B0C-A7AF-4DAE803EFFB5}" type="datetimeFigureOut">
               <a:rPr lang="en-US" smtClean="0"/>
-              <a:t>11/19/2017</a:t>
+              <a:t>1/13/2018</a:t>
             </a:fld>
             <a:endParaRPr lang="en-US"/>
           </a:p>
@@ -2409,7 +2409,7 @@
     </p:spTree>
     <p:extLst>
       <p:ext uri="{BB962C8B-B14F-4D97-AF65-F5344CB8AC3E}">
-        <p14:creationId xmlns:p14="http://schemas.microsoft.com/office/powerpoint/2010/main" val="2555676021"/>
+        <p14:creationId xmlns:p14="http://schemas.microsoft.com/office/powerpoint/2010/main" val="2917103541"/>
       </p:ext>
     </p:extLst>
   </p:cSld>
@@ -2453,8 +2453,8 @@
         </p:nvSpPr>
         <p:spPr>
           <a:xfrm>
-            <a:off x="628650" y="243417"/>
-            <a:ext cx="7886700" cy="883709"/>
+            <a:off x="754380" y="292101"/>
+            <a:ext cx="9464040" cy="1060450"/>
           </a:xfrm>
           <a:prstGeom prst="rect">
             <a:avLst/>
@@ -2486,8 +2486,8 @@
         </p:nvSpPr>
         <p:spPr>
           <a:xfrm>
-            <a:off x="628650" y="1217083"/>
-            <a:ext cx="7886700" cy="2900892"/>
+            <a:off x="754380" y="1460500"/>
+            <a:ext cx="9464040" cy="3481070"/>
           </a:xfrm>
           <a:prstGeom prst="rect">
             <a:avLst/>
@@ -2548,8 +2548,8 @@
         </p:nvSpPr>
         <p:spPr>
           <a:xfrm>
-            <a:off x="628650" y="4237567"/>
-            <a:ext cx="2057400" cy="243417"/>
+            <a:off x="754380" y="5085080"/>
+            <a:ext cx="2468880" cy="292100"/>
           </a:xfrm>
           <a:prstGeom prst="rect">
             <a:avLst/>
@@ -2559,7 +2559,7 @@
           <a:bodyPr vert="horz" lIns="91440" tIns="45720" rIns="91440" bIns="45720" rtlCol="0" anchor="ctr"/>
           <a:lstStyle>
             <a:lvl1pPr algn="l">
-              <a:defRPr sz="800">
+              <a:defRPr sz="960">
                 <a:solidFill>
                   <a:schemeClr val="tx1">
                     <a:tint val="75000"/>
@@ -2571,7 +2571,7 @@
           <a:p>
             <a:fld id="{7B30DEEB-4051-4B0C-A7AF-4DAE803EFFB5}" type="datetimeFigureOut">
               <a:rPr lang="en-US" smtClean="0"/>
-              <a:t>11/19/2017</a:t>
+              <a:t>1/13/2018</a:t>
             </a:fld>
             <a:endParaRPr lang="en-US"/>
           </a:p>
@@ -2589,8 +2589,8 @@
         </p:nvSpPr>
         <p:spPr>
           <a:xfrm>
-            <a:off x="3028950" y="4237567"/>
-            <a:ext cx="3086100" cy="243417"/>
+            <a:off x="3634740" y="5085080"/>
+            <a:ext cx="3703320" cy="292100"/>
           </a:xfrm>
           <a:prstGeom prst="rect">
             <a:avLst/>
@@ -2600,7 +2600,7 @@
           <a:bodyPr vert="horz" lIns="91440" tIns="45720" rIns="91440" bIns="45720" rtlCol="0" anchor="ctr"/>
           <a:lstStyle>
             <a:lvl1pPr algn="ctr">
-              <a:defRPr sz="800">
+              <a:defRPr sz="960">
                 <a:solidFill>
                   <a:schemeClr val="tx1">
                     <a:tint val="75000"/>
@@ -2626,8 +2626,8 @@
         </p:nvSpPr>
         <p:spPr>
           <a:xfrm>
-            <a:off x="6457950" y="4237567"/>
-            <a:ext cx="2057400" cy="243417"/>
+            <a:off x="7749540" y="5085080"/>
+            <a:ext cx="2468880" cy="292100"/>
           </a:xfrm>
           <a:prstGeom prst="rect">
             <a:avLst/>
@@ -2637,7 +2637,7 @@
           <a:bodyPr vert="horz" lIns="91440" tIns="45720" rIns="91440" bIns="45720" rtlCol="0" anchor="ctr"/>
           <a:lstStyle>
             <a:lvl1pPr algn="r">
-              <a:defRPr sz="800">
+              <a:defRPr sz="960">
                 <a:solidFill>
                   <a:schemeClr val="tx1">
                     <a:tint val="75000"/>
@@ -2658,27 +2658,27 @@
     </p:spTree>
     <p:extLst>
       <p:ext uri="{BB962C8B-B14F-4D97-AF65-F5344CB8AC3E}">
-        <p14:creationId xmlns:p14="http://schemas.microsoft.com/office/powerpoint/2010/main" val="869980764"/>
+        <p14:creationId xmlns:p14="http://schemas.microsoft.com/office/powerpoint/2010/main" val="3697203796"/>
       </p:ext>
     </p:extLst>
   </p:cSld>
   <p:clrMap bg1="lt1" tx1="dk1" bg2="lt2" tx2="dk2" accent1="accent1" accent2="accent2" accent3="accent3" accent4="accent4" accent5="accent5" accent6="accent6" hlink="hlink" folHlink="folHlink"/>
   <p:sldLayoutIdLst>
-    <p:sldLayoutId id="2147483697" r:id="rId1"/>
-    <p:sldLayoutId id="2147483698" r:id="rId2"/>
-    <p:sldLayoutId id="2147483699" r:id="rId3"/>
-    <p:sldLayoutId id="2147483700" r:id="rId4"/>
-    <p:sldLayoutId id="2147483701" r:id="rId5"/>
-    <p:sldLayoutId id="2147483702" r:id="rId6"/>
-    <p:sldLayoutId id="2147483703" r:id="rId7"/>
-    <p:sldLayoutId id="2147483704" r:id="rId8"/>
-    <p:sldLayoutId id="2147483705" r:id="rId9"/>
-    <p:sldLayoutId id="2147483706" r:id="rId10"/>
-    <p:sldLayoutId id="2147483707" r:id="rId11"/>
+    <p:sldLayoutId id="2147483709" r:id="rId1"/>
+    <p:sldLayoutId id="2147483710" r:id="rId2"/>
+    <p:sldLayoutId id="2147483711" r:id="rId3"/>
+    <p:sldLayoutId id="2147483712" r:id="rId4"/>
+    <p:sldLayoutId id="2147483713" r:id="rId5"/>
+    <p:sldLayoutId id="2147483714" r:id="rId6"/>
+    <p:sldLayoutId id="2147483715" r:id="rId7"/>
+    <p:sldLayoutId id="2147483716" r:id="rId8"/>
+    <p:sldLayoutId id="2147483717" r:id="rId9"/>
+    <p:sldLayoutId id="2147483718" r:id="rId10"/>
+    <p:sldLayoutId id="2147483719" r:id="rId11"/>
   </p:sldLayoutIdLst>
   <p:txStyles>
     <p:titleStyle>
-      <a:lvl1pPr algn="l" defTabSz="609630" rtl="0" eaLnBrk="1" latinLnBrk="0" hangingPunct="1">
+      <a:lvl1pPr algn="l" defTabSz="731520" rtl="0" eaLnBrk="1" latinLnBrk="0" hangingPunct="1">
         <a:lnSpc>
           <a:spcPct val="90000"/>
         </a:lnSpc>
@@ -2686,7 +2686,7 @@
           <a:spcPct val="0"/>
         </a:spcBef>
         <a:buNone/>
-        <a:defRPr sz="2933" kern="1200">
+        <a:defRPr sz="3520" kern="1200">
           <a:solidFill>
             <a:schemeClr val="tx1"/>
           </a:solidFill>
@@ -2697,16 +2697,16 @@
       </a:lvl1pPr>
     </p:titleStyle>
     <p:bodyStyle>
-      <a:lvl1pPr marL="152408" indent="-152408" algn="l" defTabSz="609630" rtl="0" eaLnBrk="1" latinLnBrk="0" hangingPunct="1">
+      <a:lvl1pPr marL="182880" indent="-182880" algn="l" defTabSz="731520" rtl="0" eaLnBrk="1" latinLnBrk="0" hangingPunct="1">
         <a:lnSpc>
           <a:spcPct val="90000"/>
         </a:lnSpc>
         <a:spcBef>
-          <a:spcPts val="667"/>
+          <a:spcPts val="800"/>
         </a:spcBef>
         <a:buFont typeface="Arial" panose="020B0604020202020204" pitchFamily="34" charset="0"/>
         <a:buChar char="•"/>
-        <a:defRPr sz="1867" kern="1200">
+        <a:defRPr sz="2240" kern="1200">
           <a:solidFill>
             <a:schemeClr val="tx1"/>
           </a:solidFill>
@@ -2715,12 +2715,30 @@
           <a:cs typeface="+mn-cs"/>
         </a:defRPr>
       </a:lvl1pPr>
-      <a:lvl2pPr marL="457223" indent="-152408" algn="l" defTabSz="609630" rtl="0" eaLnBrk="1" latinLnBrk="0" hangingPunct="1">
+      <a:lvl2pPr marL="548640" indent="-182880" algn="l" defTabSz="731520" rtl="0" eaLnBrk="1" latinLnBrk="0" hangingPunct="1">
         <a:lnSpc>
           <a:spcPct val="90000"/>
         </a:lnSpc>
         <a:spcBef>
-          <a:spcPts val="333"/>
+          <a:spcPts val="400"/>
+        </a:spcBef>
+        <a:buFont typeface="Arial" panose="020B0604020202020204" pitchFamily="34" charset="0"/>
+        <a:buChar char="•"/>
+        <a:defRPr sz="1920" kern="1200">
+          <a:solidFill>
+            <a:schemeClr val="tx1"/>
+          </a:solidFill>
+          <a:latin typeface="+mn-lt"/>
+          <a:ea typeface="+mn-ea"/>
+          <a:cs typeface="+mn-cs"/>
+        </a:defRPr>
+      </a:lvl2pPr>
+      <a:lvl3pPr marL="914400" indent="-182880" algn="l" defTabSz="731520" rtl="0" eaLnBrk="1" latinLnBrk="0" hangingPunct="1">
+        <a:lnSpc>
+          <a:spcPct val="90000"/>
+        </a:lnSpc>
+        <a:spcBef>
+          <a:spcPts val="400"/>
         </a:spcBef>
         <a:buFont typeface="Arial" panose="020B0604020202020204" pitchFamily="34" charset="0"/>
         <a:buChar char="•"/>
@@ -2732,35 +2750,17 @@
           <a:ea typeface="+mn-ea"/>
           <a:cs typeface="+mn-cs"/>
         </a:defRPr>
-      </a:lvl2pPr>
-      <a:lvl3pPr marL="762038" indent="-152408" algn="l" defTabSz="609630" rtl="0" eaLnBrk="1" latinLnBrk="0" hangingPunct="1">
+      </a:lvl3pPr>
+      <a:lvl4pPr marL="1280160" indent="-182880" algn="l" defTabSz="731520" rtl="0" eaLnBrk="1" latinLnBrk="0" hangingPunct="1">
         <a:lnSpc>
           <a:spcPct val="90000"/>
         </a:lnSpc>
         <a:spcBef>
-          <a:spcPts val="333"/>
+          <a:spcPts val="400"/>
         </a:spcBef>
         <a:buFont typeface="Arial" panose="020B0604020202020204" pitchFamily="34" charset="0"/>
         <a:buChar char="•"/>
-        <a:defRPr sz="1333" kern="1200">
-          <a:solidFill>
-            <a:schemeClr val="tx1"/>
-          </a:solidFill>
-          <a:latin typeface="+mn-lt"/>
-          <a:ea typeface="+mn-ea"/>
-          <a:cs typeface="+mn-cs"/>
-        </a:defRPr>
-      </a:lvl3pPr>
-      <a:lvl4pPr marL="1066853" indent="-152408" algn="l" defTabSz="609630" rtl="0" eaLnBrk="1" latinLnBrk="0" hangingPunct="1">
-        <a:lnSpc>
-          <a:spcPct val="90000"/>
-        </a:lnSpc>
-        <a:spcBef>
-          <a:spcPts val="333"/>
-        </a:spcBef>
-        <a:buFont typeface="Arial" panose="020B0604020202020204" pitchFamily="34" charset="0"/>
-        <a:buChar char="•"/>
-        <a:defRPr sz="1200" kern="1200">
+        <a:defRPr sz="1440" kern="1200">
           <a:solidFill>
             <a:schemeClr val="tx1"/>
           </a:solidFill>
@@ -2769,16 +2769,16 @@
           <a:cs typeface="+mn-cs"/>
         </a:defRPr>
       </a:lvl4pPr>
-      <a:lvl5pPr marL="1371669" indent="-152408" algn="l" defTabSz="609630" rtl="0" eaLnBrk="1" latinLnBrk="0" hangingPunct="1">
+      <a:lvl5pPr marL="1645920" indent="-182880" algn="l" defTabSz="731520" rtl="0" eaLnBrk="1" latinLnBrk="0" hangingPunct="1">
         <a:lnSpc>
           <a:spcPct val="90000"/>
         </a:lnSpc>
         <a:spcBef>
-          <a:spcPts val="333"/>
+          <a:spcPts val="400"/>
         </a:spcBef>
         <a:buFont typeface="Arial" panose="020B0604020202020204" pitchFamily="34" charset="0"/>
         <a:buChar char="•"/>
-        <a:defRPr sz="1200" kern="1200">
+        <a:defRPr sz="1440" kern="1200">
           <a:solidFill>
             <a:schemeClr val="tx1"/>
           </a:solidFill>
@@ -2787,16 +2787,16 @@
           <a:cs typeface="+mn-cs"/>
         </a:defRPr>
       </a:lvl5pPr>
-      <a:lvl6pPr marL="1676484" indent="-152408" algn="l" defTabSz="609630" rtl="0" eaLnBrk="1" latinLnBrk="0" hangingPunct="1">
+      <a:lvl6pPr marL="2011680" indent="-182880" algn="l" defTabSz="731520" rtl="0" eaLnBrk="1" latinLnBrk="0" hangingPunct="1">
         <a:lnSpc>
           <a:spcPct val="90000"/>
         </a:lnSpc>
         <a:spcBef>
-          <a:spcPts val="333"/>
+          <a:spcPts val="400"/>
         </a:spcBef>
         <a:buFont typeface="Arial" panose="020B0604020202020204" pitchFamily="34" charset="0"/>
         <a:buChar char="•"/>
-        <a:defRPr sz="1200" kern="1200">
+        <a:defRPr sz="1440" kern="1200">
           <a:solidFill>
             <a:schemeClr val="tx1"/>
           </a:solidFill>
@@ -2805,16 +2805,16 @@
           <a:cs typeface="+mn-cs"/>
         </a:defRPr>
       </a:lvl6pPr>
-      <a:lvl7pPr marL="1981299" indent="-152408" algn="l" defTabSz="609630" rtl="0" eaLnBrk="1" latinLnBrk="0" hangingPunct="1">
+      <a:lvl7pPr marL="2377440" indent="-182880" algn="l" defTabSz="731520" rtl="0" eaLnBrk="1" latinLnBrk="0" hangingPunct="1">
         <a:lnSpc>
           <a:spcPct val="90000"/>
         </a:lnSpc>
         <a:spcBef>
-          <a:spcPts val="333"/>
+          <a:spcPts val="400"/>
         </a:spcBef>
         <a:buFont typeface="Arial" panose="020B0604020202020204" pitchFamily="34" charset="0"/>
         <a:buChar char="•"/>
-        <a:defRPr sz="1200" kern="1200">
+        <a:defRPr sz="1440" kern="1200">
           <a:solidFill>
             <a:schemeClr val="tx1"/>
           </a:solidFill>
@@ -2823,16 +2823,16 @@
           <a:cs typeface="+mn-cs"/>
         </a:defRPr>
       </a:lvl7pPr>
-      <a:lvl8pPr marL="2286114" indent="-152408" algn="l" defTabSz="609630" rtl="0" eaLnBrk="1" latinLnBrk="0" hangingPunct="1">
+      <a:lvl8pPr marL="2743200" indent="-182880" algn="l" defTabSz="731520" rtl="0" eaLnBrk="1" latinLnBrk="0" hangingPunct="1">
         <a:lnSpc>
           <a:spcPct val="90000"/>
         </a:lnSpc>
         <a:spcBef>
-          <a:spcPts val="333"/>
+          <a:spcPts val="400"/>
         </a:spcBef>
         <a:buFont typeface="Arial" panose="020B0604020202020204" pitchFamily="34" charset="0"/>
         <a:buChar char="•"/>
-        <a:defRPr sz="1200" kern="1200">
+        <a:defRPr sz="1440" kern="1200">
           <a:solidFill>
             <a:schemeClr val="tx1"/>
           </a:solidFill>
@@ -2841,16 +2841,16 @@
           <a:cs typeface="+mn-cs"/>
         </a:defRPr>
       </a:lvl8pPr>
-      <a:lvl9pPr marL="2590930" indent="-152408" algn="l" defTabSz="609630" rtl="0" eaLnBrk="1" latinLnBrk="0" hangingPunct="1">
+      <a:lvl9pPr marL="3108960" indent="-182880" algn="l" defTabSz="731520" rtl="0" eaLnBrk="1" latinLnBrk="0" hangingPunct="1">
         <a:lnSpc>
           <a:spcPct val="90000"/>
         </a:lnSpc>
         <a:spcBef>
-          <a:spcPts val="333"/>
+          <a:spcPts val="400"/>
         </a:spcBef>
         <a:buFont typeface="Arial" panose="020B0604020202020204" pitchFamily="34" charset="0"/>
         <a:buChar char="•"/>
-        <a:defRPr sz="1200" kern="1200">
+        <a:defRPr sz="1440" kern="1200">
           <a:solidFill>
             <a:schemeClr val="tx1"/>
           </a:solidFill>
@@ -2864,8 +2864,8 @@
       <a:defPPr>
         <a:defRPr lang="en-US"/>
       </a:defPPr>
-      <a:lvl1pPr marL="0" algn="l" defTabSz="609630" rtl="0" eaLnBrk="1" latinLnBrk="0" hangingPunct="1">
-        <a:defRPr sz="1200" kern="1200">
+      <a:lvl1pPr marL="0" algn="l" defTabSz="731520" rtl="0" eaLnBrk="1" latinLnBrk="0" hangingPunct="1">
+        <a:defRPr sz="1440" kern="1200">
           <a:solidFill>
             <a:schemeClr val="tx1"/>
           </a:solidFill>
@@ -2874,8 +2874,8 @@
           <a:cs typeface="+mn-cs"/>
         </a:defRPr>
       </a:lvl1pPr>
-      <a:lvl2pPr marL="304815" algn="l" defTabSz="609630" rtl="0" eaLnBrk="1" latinLnBrk="0" hangingPunct="1">
-        <a:defRPr sz="1200" kern="1200">
+      <a:lvl2pPr marL="365760" algn="l" defTabSz="731520" rtl="0" eaLnBrk="1" latinLnBrk="0" hangingPunct="1">
+        <a:defRPr sz="1440" kern="1200">
           <a:solidFill>
             <a:schemeClr val="tx1"/>
           </a:solidFill>
@@ -2884,8 +2884,8 @@
           <a:cs typeface="+mn-cs"/>
         </a:defRPr>
       </a:lvl2pPr>
-      <a:lvl3pPr marL="609630" algn="l" defTabSz="609630" rtl="0" eaLnBrk="1" latinLnBrk="0" hangingPunct="1">
-        <a:defRPr sz="1200" kern="1200">
+      <a:lvl3pPr marL="731520" algn="l" defTabSz="731520" rtl="0" eaLnBrk="1" latinLnBrk="0" hangingPunct="1">
+        <a:defRPr sz="1440" kern="1200">
           <a:solidFill>
             <a:schemeClr val="tx1"/>
           </a:solidFill>
@@ -2894,8 +2894,8 @@
           <a:cs typeface="+mn-cs"/>
         </a:defRPr>
       </a:lvl3pPr>
-      <a:lvl4pPr marL="914446" algn="l" defTabSz="609630" rtl="0" eaLnBrk="1" latinLnBrk="0" hangingPunct="1">
-        <a:defRPr sz="1200" kern="1200">
+      <a:lvl4pPr marL="1097280" algn="l" defTabSz="731520" rtl="0" eaLnBrk="1" latinLnBrk="0" hangingPunct="1">
+        <a:defRPr sz="1440" kern="1200">
           <a:solidFill>
             <a:schemeClr val="tx1"/>
           </a:solidFill>
@@ -2904,8 +2904,8 @@
           <a:cs typeface="+mn-cs"/>
         </a:defRPr>
       </a:lvl4pPr>
-      <a:lvl5pPr marL="1219261" algn="l" defTabSz="609630" rtl="0" eaLnBrk="1" latinLnBrk="0" hangingPunct="1">
-        <a:defRPr sz="1200" kern="1200">
+      <a:lvl5pPr marL="1463040" algn="l" defTabSz="731520" rtl="0" eaLnBrk="1" latinLnBrk="0" hangingPunct="1">
+        <a:defRPr sz="1440" kern="1200">
           <a:solidFill>
             <a:schemeClr val="tx1"/>
           </a:solidFill>
@@ -2914,8 +2914,8 @@
           <a:cs typeface="+mn-cs"/>
         </a:defRPr>
       </a:lvl5pPr>
-      <a:lvl6pPr marL="1524076" algn="l" defTabSz="609630" rtl="0" eaLnBrk="1" latinLnBrk="0" hangingPunct="1">
-        <a:defRPr sz="1200" kern="1200">
+      <a:lvl6pPr marL="1828800" algn="l" defTabSz="731520" rtl="0" eaLnBrk="1" latinLnBrk="0" hangingPunct="1">
+        <a:defRPr sz="1440" kern="1200">
           <a:solidFill>
             <a:schemeClr val="tx1"/>
           </a:solidFill>
@@ -2924,8 +2924,8 @@
           <a:cs typeface="+mn-cs"/>
         </a:defRPr>
       </a:lvl6pPr>
-      <a:lvl7pPr marL="1828891" algn="l" defTabSz="609630" rtl="0" eaLnBrk="1" latinLnBrk="0" hangingPunct="1">
-        <a:defRPr sz="1200" kern="1200">
+      <a:lvl7pPr marL="2194560" algn="l" defTabSz="731520" rtl="0" eaLnBrk="1" latinLnBrk="0" hangingPunct="1">
+        <a:defRPr sz="1440" kern="1200">
           <a:solidFill>
             <a:schemeClr val="tx1"/>
           </a:solidFill>
@@ -2934,8 +2934,8 @@
           <a:cs typeface="+mn-cs"/>
         </a:defRPr>
       </a:lvl7pPr>
-      <a:lvl8pPr marL="2133707" algn="l" defTabSz="609630" rtl="0" eaLnBrk="1" latinLnBrk="0" hangingPunct="1">
-        <a:defRPr sz="1200" kern="1200">
+      <a:lvl8pPr marL="2560320" algn="l" defTabSz="731520" rtl="0" eaLnBrk="1" latinLnBrk="0" hangingPunct="1">
+        <a:defRPr sz="1440" kern="1200">
           <a:solidFill>
             <a:schemeClr val="tx1"/>
           </a:solidFill>
@@ -2944,8 +2944,8 @@
           <a:cs typeface="+mn-cs"/>
         </a:defRPr>
       </a:lvl8pPr>
-      <a:lvl9pPr marL="2438522" algn="l" defTabSz="609630" rtl="0" eaLnBrk="1" latinLnBrk="0" hangingPunct="1">
-        <a:defRPr sz="1200" kern="1200">
+      <a:lvl9pPr marL="2926080" algn="l" defTabSz="731520" rtl="0" eaLnBrk="1" latinLnBrk="0" hangingPunct="1">
+        <a:defRPr sz="1440" kern="1200">
           <a:solidFill>
             <a:schemeClr val="tx1"/>
           </a:solidFill>

</xml_diff>